<commit_message>
slide updates, test changes for client and server, exception handling on server
</commit_message>
<xml_diff>
--- a/Test Pyramid Presentation.pptx
+++ b/Test Pyramid Presentation.pptx
@@ -6,6 +6,18 @@
   </p:sldMasterIdLst>
   <p:sldIdLst>
     <p:sldId id="256" r:id="rId2"/>
+    <p:sldId id="257" r:id="rId3"/>
+    <p:sldId id="258" r:id="rId4"/>
+    <p:sldId id="260" r:id="rId5"/>
+    <p:sldId id="259" r:id="rId6"/>
+    <p:sldId id="262" r:id="rId7"/>
+    <p:sldId id="263" r:id="rId8"/>
+    <p:sldId id="264" r:id="rId9"/>
+    <p:sldId id="265" r:id="rId10"/>
+    <p:sldId id="266" r:id="rId11"/>
+    <p:sldId id="267" r:id="rId12"/>
+    <p:sldId id="268" r:id="rId13"/>
+    <p:sldId id="261" r:id="rId14"/>
   </p:sldIdLst>
   <p:sldSz cx="12192000" cy="6858000"/>
   <p:notesSz cx="6858000" cy="9144000"/>
@@ -2177,12 +2189,14 @@
         </p:nvSpPr>
         <p:spPr/>
         <p:txBody>
-          <a:bodyPr/>
+          <a:bodyPr>
+            <a:normAutofit fontScale="90000"/>
+          </a:bodyPr>
           <a:lstStyle/>
           <a:p>
             <a:r>
               <a:rPr lang="en-US" dirty="0" smtClean="0"/>
-              <a:t>Mike Cohn’s Test Pyramid</a:t>
+              <a:t>The Software Testing Pyramid:</a:t>
             </a:r>
             <a:br>
               <a:rPr lang="en-US" dirty="0" smtClean="0"/>
@@ -2207,20 +2221,279 @@
         </p:nvSpPr>
         <p:spPr>
           <a:xfrm>
-            <a:off x="1524000" y="4730194"/>
-            <a:ext cx="9144000" cy="720580"/>
+            <a:off x="3657599" y="3657600"/>
+            <a:ext cx="4876801" cy="1392702"/>
           </a:xfrm>
         </p:spPr>
         <p:txBody>
-          <a:bodyPr/>
-          <a:lstStyle/>
+          <a:bodyPr>
+            <a:normAutofit fontScale="47500" lnSpcReduction="20000"/>
+          </a:bodyPr>
+          <a:lstStyle/>
+          <a:p>
+            <a:r>
+              <a:rPr lang="en-US" sz="5100" dirty="0" smtClean="0"/>
+              <a:t>Jim </a:t>
+            </a:r>
+            <a:r>
+              <a:rPr lang="en-US" sz="5100" dirty="0" smtClean="0"/>
+              <a:t>Weaver</a:t>
+            </a:r>
+          </a:p>
+          <a:p>
+            <a:r>
+              <a:rPr lang="en-US" sz="5100" dirty="0" smtClean="0"/>
+              <a:t>Vanderbilt University Medical Center</a:t>
+            </a:r>
+            <a:endParaRPr lang="en-US" sz="5100" dirty="0" smtClean="0"/>
+          </a:p>
+          <a:p>
+            <a:r>
+              <a:rPr lang="en-US" sz="5100" dirty="0" smtClean="0"/>
+              <a:t>(</a:t>
+            </a:r>
+            <a:r>
+              <a:rPr lang="en-US" sz="5100" dirty="0" err="1" smtClean="0"/>
+              <a:t>weaver.je@gmail.com</a:t>
+            </a:r>
+            <a:r>
+              <a:rPr lang="en-US" sz="5100" dirty="0" smtClean="0"/>
+              <a:t>)</a:t>
+            </a:r>
+          </a:p>
+          <a:p>
+            <a:endParaRPr lang="en-US" dirty="0"/>
+          </a:p>
+        </p:txBody>
+      </p:sp>
+      <p:sp>
+        <p:nvSpPr>
+          <p:cNvPr id="4" name="Subtitle 2"/>
+          <p:cNvSpPr txBox="1">
+            <a:spLocks/>
+          </p:cNvSpPr>
+          <p:nvPr/>
+        </p:nvSpPr>
+        <p:spPr>
+          <a:xfrm>
+            <a:off x="2928424" y="5197939"/>
+            <a:ext cx="6623539" cy="1153551"/>
+          </a:xfrm>
+          <a:prstGeom prst="rect">
+            <a:avLst/>
+          </a:prstGeom>
+        </p:spPr>
+        <p:txBody>
+          <a:bodyPr vert="horz" lIns="91440" tIns="45720" rIns="91440" bIns="45720" rtlCol="0">
+            <a:normAutofit/>
+          </a:bodyPr>
+          <a:lstStyle>
+            <a:lvl1pPr marL="0" indent="0" algn="ctr" defTabSz="914400" rtl="0" eaLnBrk="1" latinLnBrk="0" hangingPunct="1">
+              <a:lnSpc>
+                <a:spcPct val="90000"/>
+              </a:lnSpc>
+              <a:spcBef>
+                <a:spcPts val="1000"/>
+              </a:spcBef>
+              <a:buFont typeface="Arial"/>
+              <a:buNone/>
+              <a:defRPr sz="2400" kern="1200">
+                <a:solidFill>
+                  <a:schemeClr val="tx1"/>
+                </a:solidFill>
+                <a:latin typeface="+mn-lt"/>
+                <a:ea typeface="+mn-ea"/>
+                <a:cs typeface="+mn-cs"/>
+              </a:defRPr>
+            </a:lvl1pPr>
+            <a:lvl2pPr marL="457200" indent="0" algn="ctr" defTabSz="914400" rtl="0" eaLnBrk="1" latinLnBrk="0" hangingPunct="1">
+              <a:lnSpc>
+                <a:spcPct val="90000"/>
+              </a:lnSpc>
+              <a:spcBef>
+                <a:spcPts val="500"/>
+              </a:spcBef>
+              <a:buFont typeface="Arial"/>
+              <a:buNone/>
+              <a:defRPr sz="2000" kern="1200">
+                <a:solidFill>
+                  <a:schemeClr val="tx1"/>
+                </a:solidFill>
+                <a:latin typeface="+mn-lt"/>
+                <a:ea typeface="+mn-ea"/>
+                <a:cs typeface="+mn-cs"/>
+              </a:defRPr>
+            </a:lvl2pPr>
+            <a:lvl3pPr marL="914400" indent="0" algn="ctr" defTabSz="914400" rtl="0" eaLnBrk="1" latinLnBrk="0" hangingPunct="1">
+              <a:lnSpc>
+                <a:spcPct val="90000"/>
+              </a:lnSpc>
+              <a:spcBef>
+                <a:spcPts val="500"/>
+              </a:spcBef>
+              <a:buFont typeface="Arial"/>
+              <a:buNone/>
+              <a:defRPr sz="1800" kern="1200">
+                <a:solidFill>
+                  <a:schemeClr val="tx1"/>
+                </a:solidFill>
+                <a:latin typeface="+mn-lt"/>
+                <a:ea typeface="+mn-ea"/>
+                <a:cs typeface="+mn-cs"/>
+              </a:defRPr>
+            </a:lvl3pPr>
+            <a:lvl4pPr marL="1371600" indent="0" algn="ctr" defTabSz="914400" rtl="0" eaLnBrk="1" latinLnBrk="0" hangingPunct="1">
+              <a:lnSpc>
+                <a:spcPct val="90000"/>
+              </a:lnSpc>
+              <a:spcBef>
+                <a:spcPts val="500"/>
+              </a:spcBef>
+              <a:buFont typeface="Arial"/>
+              <a:buNone/>
+              <a:defRPr sz="1600" kern="1200">
+                <a:solidFill>
+                  <a:schemeClr val="tx1"/>
+                </a:solidFill>
+                <a:latin typeface="+mn-lt"/>
+                <a:ea typeface="+mn-ea"/>
+                <a:cs typeface="+mn-cs"/>
+              </a:defRPr>
+            </a:lvl4pPr>
+            <a:lvl5pPr marL="1828800" indent="0" algn="ctr" defTabSz="914400" rtl="0" eaLnBrk="1" latinLnBrk="0" hangingPunct="1">
+              <a:lnSpc>
+                <a:spcPct val="90000"/>
+              </a:lnSpc>
+              <a:spcBef>
+                <a:spcPts val="500"/>
+              </a:spcBef>
+              <a:buFont typeface="Arial"/>
+              <a:buNone/>
+              <a:defRPr sz="1600" kern="1200">
+                <a:solidFill>
+                  <a:schemeClr val="tx1"/>
+                </a:solidFill>
+                <a:latin typeface="+mn-lt"/>
+                <a:ea typeface="+mn-ea"/>
+                <a:cs typeface="+mn-cs"/>
+              </a:defRPr>
+            </a:lvl5pPr>
+            <a:lvl6pPr marL="2286000" indent="0" algn="ctr" defTabSz="914400" rtl="0" eaLnBrk="1" latinLnBrk="0" hangingPunct="1">
+              <a:lnSpc>
+                <a:spcPct val="90000"/>
+              </a:lnSpc>
+              <a:spcBef>
+                <a:spcPts val="500"/>
+              </a:spcBef>
+              <a:buFont typeface="Arial"/>
+              <a:buNone/>
+              <a:defRPr sz="1600" kern="1200">
+                <a:solidFill>
+                  <a:schemeClr val="tx1"/>
+                </a:solidFill>
+                <a:latin typeface="+mn-lt"/>
+                <a:ea typeface="+mn-ea"/>
+                <a:cs typeface="+mn-cs"/>
+              </a:defRPr>
+            </a:lvl6pPr>
+            <a:lvl7pPr marL="2743200" indent="0" algn="ctr" defTabSz="914400" rtl="0" eaLnBrk="1" latinLnBrk="0" hangingPunct="1">
+              <a:lnSpc>
+                <a:spcPct val="90000"/>
+              </a:lnSpc>
+              <a:spcBef>
+                <a:spcPts val="500"/>
+              </a:spcBef>
+              <a:buFont typeface="Arial"/>
+              <a:buNone/>
+              <a:defRPr sz="1600" kern="1200">
+                <a:solidFill>
+                  <a:schemeClr val="tx1"/>
+                </a:solidFill>
+                <a:latin typeface="+mn-lt"/>
+                <a:ea typeface="+mn-ea"/>
+                <a:cs typeface="+mn-cs"/>
+              </a:defRPr>
+            </a:lvl7pPr>
+            <a:lvl8pPr marL="3200400" indent="0" algn="ctr" defTabSz="914400" rtl="0" eaLnBrk="1" latinLnBrk="0" hangingPunct="1">
+              <a:lnSpc>
+                <a:spcPct val="90000"/>
+              </a:lnSpc>
+              <a:spcBef>
+                <a:spcPts val="500"/>
+              </a:spcBef>
+              <a:buFont typeface="Arial"/>
+              <a:buNone/>
+              <a:defRPr sz="1600" kern="1200">
+                <a:solidFill>
+                  <a:schemeClr val="tx1"/>
+                </a:solidFill>
+                <a:latin typeface="+mn-lt"/>
+                <a:ea typeface="+mn-ea"/>
+                <a:cs typeface="+mn-cs"/>
+              </a:defRPr>
+            </a:lvl8pPr>
+            <a:lvl9pPr marL="3657600" indent="0" algn="ctr" defTabSz="914400" rtl="0" eaLnBrk="1" latinLnBrk="0" hangingPunct="1">
+              <a:lnSpc>
+                <a:spcPct val="90000"/>
+              </a:lnSpc>
+              <a:spcBef>
+                <a:spcPts val="500"/>
+              </a:spcBef>
+              <a:buFont typeface="Arial"/>
+              <a:buNone/>
+              <a:defRPr sz="1600" kern="1200">
+                <a:solidFill>
+                  <a:schemeClr val="tx1"/>
+                </a:solidFill>
+                <a:latin typeface="+mn-lt"/>
+                <a:ea typeface="+mn-ea"/>
+                <a:cs typeface="+mn-cs"/>
+              </a:defRPr>
+            </a:lvl9pPr>
+          </a:lstStyle>
           <a:p>
             <a:r>
               <a:rPr lang="en-US" dirty="0" smtClean="0"/>
-              <a:t>Jim Weaver</a:t>
-            </a:r>
-          </a:p>
-          <a:p>
+              <a:t>Source Code and Tests</a:t>
+            </a:r>
+          </a:p>
+          <a:p>
+            <a:r>
+              <a:rPr lang="en-US" dirty="0">
+                <a:hlinkClick r:id="rId2"/>
+              </a:rPr>
+              <a:t>https://</a:t>
+            </a:r>
+            <a:r>
+              <a:rPr lang="en-US" dirty="0" err="1">
+                <a:hlinkClick r:id="rId2"/>
+              </a:rPr>
+              <a:t>github.com</a:t>
+            </a:r>
+            <a:r>
+              <a:rPr lang="en-US" dirty="0">
+                <a:hlinkClick r:id="rId2"/>
+              </a:rPr>
+              <a:t>/</a:t>
+            </a:r>
+            <a:r>
+              <a:rPr lang="en-US" dirty="0" err="1">
+                <a:hlinkClick r:id="rId2"/>
+              </a:rPr>
+              <a:t>weaverj</a:t>
+            </a:r>
+            <a:r>
+              <a:rPr lang="en-US" dirty="0">
+                <a:hlinkClick r:id="rId2"/>
+              </a:rPr>
+              <a:t>/</a:t>
+            </a:r>
+            <a:r>
+              <a:rPr lang="en-US" dirty="0" err="1">
+                <a:hlinkClick r:id="rId2"/>
+              </a:rPr>
+              <a:t>testpyramidexample</a:t>
+            </a:r>
             <a:endParaRPr lang="en-US" dirty="0"/>
           </a:p>
         </p:txBody>
@@ -2229,6 +2502,894 @@
     <p:extLst>
       <p:ext uri="{BB962C8B-B14F-4D97-AF65-F5344CB8AC3E}">
         <p14:creationId xmlns:p14="http://schemas.microsoft.com/office/powerpoint/2010/main" val="631790168"/>
+      </p:ext>
+    </p:extLst>
+  </p:cSld>
+  <p:clrMapOvr>
+    <a:masterClrMapping/>
+  </p:clrMapOvr>
+</p:sld>
+</file>
+
+<file path=ppt/slides/slide10.xml><?xml version="1.0" encoding="utf-8"?>
+<p:sld xmlns:a="http://schemas.openxmlformats.org/drawingml/2006/main" xmlns:r="http://schemas.openxmlformats.org/officeDocument/2006/relationships" xmlns:p="http://schemas.openxmlformats.org/presentationml/2006/main">
+  <p:cSld>
+    <p:spTree>
+      <p:nvGrpSpPr>
+        <p:cNvPr id="1" name=""/>
+        <p:cNvGrpSpPr/>
+        <p:nvPr/>
+      </p:nvGrpSpPr>
+      <p:grpSpPr>
+        <a:xfrm>
+          <a:off x="0" y="0"/>
+          <a:ext cx="0" cy="0"/>
+          <a:chOff x="0" y="0"/>
+          <a:chExt cx="0" cy="0"/>
+        </a:xfrm>
+      </p:grpSpPr>
+      <p:sp>
+        <p:nvSpPr>
+          <p:cNvPr id="2" name="Title 1"/>
+          <p:cNvSpPr>
+            <a:spLocks noGrp="1"/>
+          </p:cNvSpPr>
+          <p:nvPr>
+            <p:ph type="title"/>
+          </p:nvPr>
+        </p:nvSpPr>
+        <p:spPr/>
+        <p:txBody>
+          <a:bodyPr/>
+          <a:lstStyle/>
+          <a:p>
+            <a:r>
+              <a:rPr lang="en-US" dirty="0" smtClean="0"/>
+              <a:t>Unit Tests / Implementation</a:t>
+            </a:r>
+            <a:endParaRPr lang="en-US" dirty="0"/>
+          </a:p>
+        </p:txBody>
+      </p:sp>
+      <p:sp>
+        <p:nvSpPr>
+          <p:cNvPr id="3" name="Content Placeholder 2"/>
+          <p:cNvSpPr>
+            <a:spLocks noGrp="1"/>
+          </p:cNvSpPr>
+          <p:nvPr>
+            <p:ph idx="1"/>
+          </p:nvPr>
+        </p:nvSpPr>
+        <p:spPr/>
+        <p:txBody>
+          <a:bodyPr/>
+          <a:lstStyle/>
+          <a:p>
+            <a:endParaRPr lang="en-US"/>
+          </a:p>
+        </p:txBody>
+      </p:sp>
+    </p:spTree>
+    <p:extLst>
+      <p:ext uri="{BB962C8B-B14F-4D97-AF65-F5344CB8AC3E}">
+        <p14:creationId xmlns:p14="http://schemas.microsoft.com/office/powerpoint/2010/main" val="1186586424"/>
+      </p:ext>
+    </p:extLst>
+  </p:cSld>
+  <p:clrMapOvr>
+    <a:masterClrMapping/>
+  </p:clrMapOvr>
+</p:sld>
+</file>
+
+<file path=ppt/slides/slide11.xml><?xml version="1.0" encoding="utf-8"?>
+<p:sld xmlns:a="http://schemas.openxmlformats.org/drawingml/2006/main" xmlns:r="http://schemas.openxmlformats.org/officeDocument/2006/relationships" xmlns:p="http://schemas.openxmlformats.org/presentationml/2006/main">
+  <p:cSld>
+    <p:spTree>
+      <p:nvGrpSpPr>
+        <p:cNvPr id="1" name=""/>
+        <p:cNvGrpSpPr/>
+        <p:nvPr/>
+      </p:nvGrpSpPr>
+      <p:grpSpPr>
+        <a:xfrm>
+          <a:off x="0" y="0"/>
+          <a:ext cx="0" cy="0"/>
+          <a:chOff x="0" y="0"/>
+          <a:chExt cx="0" cy="0"/>
+        </a:xfrm>
+      </p:grpSpPr>
+      <p:sp>
+        <p:nvSpPr>
+          <p:cNvPr id="2" name="Title 1"/>
+          <p:cNvSpPr>
+            <a:spLocks noGrp="1"/>
+          </p:cNvSpPr>
+          <p:nvPr>
+            <p:ph type="title"/>
+          </p:nvPr>
+        </p:nvSpPr>
+        <p:spPr/>
+        <p:txBody>
+          <a:bodyPr/>
+          <a:lstStyle/>
+          <a:p>
+            <a:r>
+              <a:rPr lang="en-US" dirty="0" smtClean="0"/>
+              <a:t>UI Tests</a:t>
+            </a:r>
+            <a:endParaRPr lang="en-US" dirty="0"/>
+          </a:p>
+        </p:txBody>
+      </p:sp>
+      <p:sp>
+        <p:nvSpPr>
+          <p:cNvPr id="3" name="Content Placeholder 2"/>
+          <p:cNvSpPr>
+            <a:spLocks noGrp="1"/>
+          </p:cNvSpPr>
+          <p:nvPr>
+            <p:ph idx="1"/>
+          </p:nvPr>
+        </p:nvSpPr>
+        <p:spPr/>
+        <p:txBody>
+          <a:bodyPr/>
+          <a:lstStyle/>
+          <a:p>
+            <a:endParaRPr lang="en-US"/>
+          </a:p>
+        </p:txBody>
+      </p:sp>
+    </p:spTree>
+    <p:extLst>
+      <p:ext uri="{BB962C8B-B14F-4D97-AF65-F5344CB8AC3E}">
+        <p14:creationId xmlns:p14="http://schemas.microsoft.com/office/powerpoint/2010/main" val="1221391828"/>
+      </p:ext>
+    </p:extLst>
+  </p:cSld>
+  <p:clrMapOvr>
+    <a:masterClrMapping/>
+  </p:clrMapOvr>
+</p:sld>
+</file>
+
+<file path=ppt/slides/slide12.xml><?xml version="1.0" encoding="utf-8"?>
+<p:sld xmlns:a="http://schemas.openxmlformats.org/drawingml/2006/main" xmlns:r="http://schemas.openxmlformats.org/officeDocument/2006/relationships" xmlns:p="http://schemas.openxmlformats.org/presentationml/2006/main">
+  <p:cSld>
+    <p:spTree>
+      <p:nvGrpSpPr>
+        <p:cNvPr id="1" name=""/>
+        <p:cNvGrpSpPr/>
+        <p:nvPr/>
+      </p:nvGrpSpPr>
+      <p:grpSpPr>
+        <a:xfrm>
+          <a:off x="0" y="0"/>
+          <a:ext cx="0" cy="0"/>
+          <a:chOff x="0" y="0"/>
+          <a:chExt cx="0" cy="0"/>
+        </a:xfrm>
+      </p:grpSpPr>
+      <p:sp>
+        <p:nvSpPr>
+          <p:cNvPr id="2" name="Title 1"/>
+          <p:cNvSpPr>
+            <a:spLocks noGrp="1"/>
+          </p:cNvSpPr>
+          <p:nvPr>
+            <p:ph type="title"/>
+          </p:nvPr>
+        </p:nvSpPr>
+        <p:spPr/>
+        <p:txBody>
+          <a:bodyPr/>
+          <a:lstStyle/>
+          <a:p>
+            <a:r>
+              <a:rPr lang="en-US" dirty="0" smtClean="0"/>
+              <a:t>Summary</a:t>
+            </a:r>
+            <a:endParaRPr lang="en-US" dirty="0"/>
+          </a:p>
+        </p:txBody>
+      </p:sp>
+      <p:sp>
+        <p:nvSpPr>
+          <p:cNvPr id="3" name="Content Placeholder 2"/>
+          <p:cNvSpPr>
+            <a:spLocks noGrp="1"/>
+          </p:cNvSpPr>
+          <p:nvPr>
+            <p:ph idx="1"/>
+          </p:nvPr>
+        </p:nvSpPr>
+        <p:spPr/>
+        <p:txBody>
+          <a:bodyPr/>
+          <a:lstStyle/>
+          <a:p>
+            <a:endParaRPr lang="en-US"/>
+          </a:p>
+        </p:txBody>
+      </p:sp>
+    </p:spTree>
+    <p:extLst>
+      <p:ext uri="{BB962C8B-B14F-4D97-AF65-F5344CB8AC3E}">
+        <p14:creationId xmlns:p14="http://schemas.microsoft.com/office/powerpoint/2010/main" val="73434570"/>
+      </p:ext>
+    </p:extLst>
+  </p:cSld>
+  <p:clrMapOvr>
+    <a:masterClrMapping/>
+  </p:clrMapOvr>
+</p:sld>
+</file>
+
+<file path=ppt/slides/slide13.xml><?xml version="1.0" encoding="utf-8"?>
+<p:sld xmlns:a="http://schemas.openxmlformats.org/drawingml/2006/main" xmlns:r="http://schemas.openxmlformats.org/officeDocument/2006/relationships" xmlns:p="http://schemas.openxmlformats.org/presentationml/2006/main">
+  <p:cSld>
+    <p:spTree>
+      <p:nvGrpSpPr>
+        <p:cNvPr id="1" name=""/>
+        <p:cNvGrpSpPr/>
+        <p:nvPr/>
+      </p:nvGrpSpPr>
+      <p:grpSpPr>
+        <a:xfrm>
+          <a:off x="0" y="0"/>
+          <a:ext cx="0" cy="0"/>
+          <a:chOff x="0" y="0"/>
+          <a:chExt cx="0" cy="0"/>
+        </a:xfrm>
+      </p:grpSpPr>
+      <p:sp>
+        <p:nvSpPr>
+          <p:cNvPr id="2" name="Title 1"/>
+          <p:cNvSpPr>
+            <a:spLocks noGrp="1"/>
+          </p:cNvSpPr>
+          <p:nvPr>
+            <p:ph type="title"/>
+          </p:nvPr>
+        </p:nvSpPr>
+        <p:spPr/>
+        <p:txBody>
+          <a:bodyPr/>
+          <a:lstStyle/>
+          <a:p>
+            <a:r>
+              <a:rPr lang="en-US" dirty="0" smtClean="0"/>
+              <a:t>References</a:t>
+            </a:r>
+            <a:endParaRPr lang="en-US" dirty="0"/>
+          </a:p>
+        </p:txBody>
+      </p:sp>
+      <p:sp>
+        <p:nvSpPr>
+          <p:cNvPr id="3" name="Content Placeholder 2"/>
+          <p:cNvSpPr>
+            <a:spLocks noGrp="1"/>
+          </p:cNvSpPr>
+          <p:nvPr>
+            <p:ph idx="1"/>
+          </p:nvPr>
+        </p:nvSpPr>
+        <p:spPr/>
+        <p:txBody>
+          <a:bodyPr/>
+          <a:lstStyle/>
+          <a:p>
+            <a:endParaRPr lang="en-US"/>
+          </a:p>
+        </p:txBody>
+      </p:sp>
+    </p:spTree>
+    <p:extLst>
+      <p:ext uri="{BB962C8B-B14F-4D97-AF65-F5344CB8AC3E}">
+        <p14:creationId xmlns:p14="http://schemas.microsoft.com/office/powerpoint/2010/main" val="1201606013"/>
+      </p:ext>
+    </p:extLst>
+  </p:cSld>
+  <p:clrMapOvr>
+    <a:masterClrMapping/>
+  </p:clrMapOvr>
+</p:sld>
+</file>
+
+<file path=ppt/slides/slide2.xml><?xml version="1.0" encoding="utf-8"?>
+<p:sld xmlns:a="http://schemas.openxmlformats.org/drawingml/2006/main" xmlns:r="http://schemas.openxmlformats.org/officeDocument/2006/relationships" xmlns:p="http://schemas.openxmlformats.org/presentationml/2006/main">
+  <p:cSld>
+    <p:spTree>
+      <p:nvGrpSpPr>
+        <p:cNvPr id="1" name=""/>
+        <p:cNvGrpSpPr/>
+        <p:nvPr/>
+      </p:nvGrpSpPr>
+      <p:grpSpPr>
+        <a:xfrm>
+          <a:off x="0" y="0"/>
+          <a:ext cx="0" cy="0"/>
+          <a:chOff x="0" y="0"/>
+          <a:chExt cx="0" cy="0"/>
+        </a:xfrm>
+      </p:grpSpPr>
+      <p:sp>
+        <p:nvSpPr>
+          <p:cNvPr id="2" name="Title 1"/>
+          <p:cNvSpPr>
+            <a:spLocks noGrp="1"/>
+          </p:cNvSpPr>
+          <p:nvPr>
+            <p:ph type="title"/>
+          </p:nvPr>
+        </p:nvSpPr>
+        <p:spPr/>
+        <p:txBody>
+          <a:bodyPr/>
+          <a:lstStyle/>
+          <a:p>
+            <a:r>
+              <a:rPr lang="en-US" dirty="0" smtClean="0"/>
+              <a:t>The Testing Pyramid </a:t>
+            </a:r>
+            <a:r>
+              <a:rPr lang="mr-IN" dirty="0" smtClean="0"/>
+              <a:t>–</a:t>
+            </a:r>
+            <a:r>
+              <a:rPr lang="en-US" dirty="0" smtClean="0"/>
+              <a:t> What is it?</a:t>
+            </a:r>
+            <a:endParaRPr lang="en-US" dirty="0"/>
+          </a:p>
+        </p:txBody>
+      </p:sp>
+      <p:sp>
+        <p:nvSpPr>
+          <p:cNvPr id="3" name="Content Placeholder 2"/>
+          <p:cNvSpPr>
+            <a:spLocks noGrp="1"/>
+          </p:cNvSpPr>
+          <p:nvPr>
+            <p:ph idx="1"/>
+          </p:nvPr>
+        </p:nvSpPr>
+        <p:spPr/>
+        <p:txBody>
+          <a:bodyPr/>
+          <a:lstStyle/>
+          <a:p>
+            <a:endParaRPr lang="en-US" dirty="0"/>
+          </a:p>
+        </p:txBody>
+      </p:sp>
+    </p:spTree>
+    <p:extLst>
+      <p:ext uri="{BB962C8B-B14F-4D97-AF65-F5344CB8AC3E}">
+        <p14:creationId xmlns:p14="http://schemas.microsoft.com/office/powerpoint/2010/main" val="399150034"/>
+      </p:ext>
+    </p:extLst>
+  </p:cSld>
+  <p:clrMapOvr>
+    <a:masterClrMapping/>
+  </p:clrMapOvr>
+</p:sld>
+</file>
+
+<file path=ppt/slides/slide3.xml><?xml version="1.0" encoding="utf-8"?>
+<p:sld xmlns:a="http://schemas.openxmlformats.org/drawingml/2006/main" xmlns:r="http://schemas.openxmlformats.org/officeDocument/2006/relationships" xmlns:p="http://schemas.openxmlformats.org/presentationml/2006/main">
+  <p:cSld>
+    <p:spTree>
+      <p:nvGrpSpPr>
+        <p:cNvPr id="1" name=""/>
+        <p:cNvGrpSpPr/>
+        <p:nvPr/>
+      </p:nvGrpSpPr>
+      <p:grpSpPr>
+        <a:xfrm>
+          <a:off x="0" y="0"/>
+          <a:ext cx="0" cy="0"/>
+          <a:chOff x="0" y="0"/>
+          <a:chExt cx="0" cy="0"/>
+        </a:xfrm>
+      </p:grpSpPr>
+      <p:sp>
+        <p:nvSpPr>
+          <p:cNvPr id="2" name="Title 1"/>
+          <p:cNvSpPr>
+            <a:spLocks noGrp="1"/>
+          </p:cNvSpPr>
+          <p:nvPr>
+            <p:ph type="title"/>
+          </p:nvPr>
+        </p:nvSpPr>
+        <p:spPr/>
+        <p:txBody>
+          <a:bodyPr/>
+          <a:lstStyle/>
+          <a:p>
+            <a:r>
+              <a:rPr lang="en-US" dirty="0" smtClean="0"/>
+              <a:t>The Testing Pyramid </a:t>
+            </a:r>
+            <a:r>
+              <a:rPr lang="mr-IN" dirty="0" smtClean="0"/>
+              <a:t>–</a:t>
+            </a:r>
+            <a:r>
+              <a:rPr lang="en-US" dirty="0" smtClean="0"/>
+              <a:t> Why?</a:t>
+            </a:r>
+            <a:endParaRPr lang="en-US" dirty="0"/>
+          </a:p>
+        </p:txBody>
+      </p:sp>
+      <p:sp>
+        <p:nvSpPr>
+          <p:cNvPr id="3" name="Content Placeholder 2"/>
+          <p:cNvSpPr>
+            <a:spLocks noGrp="1"/>
+          </p:cNvSpPr>
+          <p:nvPr>
+            <p:ph idx="1"/>
+          </p:nvPr>
+        </p:nvSpPr>
+        <p:spPr/>
+        <p:txBody>
+          <a:bodyPr/>
+          <a:lstStyle/>
+          <a:p>
+            <a:endParaRPr lang="en-US"/>
+          </a:p>
+        </p:txBody>
+      </p:sp>
+    </p:spTree>
+    <p:extLst>
+      <p:ext uri="{BB962C8B-B14F-4D97-AF65-F5344CB8AC3E}">
+        <p14:creationId xmlns:p14="http://schemas.microsoft.com/office/powerpoint/2010/main" val="1886559307"/>
+      </p:ext>
+    </p:extLst>
+  </p:cSld>
+  <p:clrMapOvr>
+    <a:masterClrMapping/>
+  </p:clrMapOvr>
+</p:sld>
+</file>
+
+<file path=ppt/slides/slide4.xml><?xml version="1.0" encoding="utf-8"?>
+<p:sld xmlns:a="http://schemas.openxmlformats.org/drawingml/2006/main" xmlns:r="http://schemas.openxmlformats.org/officeDocument/2006/relationships" xmlns:p="http://schemas.openxmlformats.org/presentationml/2006/main">
+  <p:cSld>
+    <p:spTree>
+      <p:nvGrpSpPr>
+        <p:cNvPr id="1" name=""/>
+        <p:cNvGrpSpPr/>
+        <p:nvPr/>
+      </p:nvGrpSpPr>
+      <p:grpSpPr>
+        <a:xfrm>
+          <a:off x="0" y="0"/>
+          <a:ext cx="0" cy="0"/>
+          <a:chOff x="0" y="0"/>
+          <a:chExt cx="0" cy="0"/>
+        </a:xfrm>
+      </p:grpSpPr>
+      <p:sp>
+        <p:nvSpPr>
+          <p:cNvPr id="2" name="Title 1"/>
+          <p:cNvSpPr>
+            <a:spLocks noGrp="1"/>
+          </p:cNvSpPr>
+          <p:nvPr>
+            <p:ph type="title"/>
+          </p:nvPr>
+        </p:nvSpPr>
+        <p:spPr/>
+        <p:txBody>
+          <a:bodyPr/>
+          <a:lstStyle/>
+          <a:p>
+            <a:r>
+              <a:rPr lang="en-US" dirty="0" smtClean="0"/>
+              <a:t>Challenges</a:t>
+            </a:r>
+            <a:endParaRPr lang="en-US" dirty="0"/>
+          </a:p>
+        </p:txBody>
+      </p:sp>
+      <p:sp>
+        <p:nvSpPr>
+          <p:cNvPr id="3" name="Content Placeholder 2"/>
+          <p:cNvSpPr>
+            <a:spLocks noGrp="1"/>
+          </p:cNvSpPr>
+          <p:nvPr>
+            <p:ph idx="1"/>
+          </p:nvPr>
+        </p:nvSpPr>
+        <p:spPr/>
+        <p:txBody>
+          <a:bodyPr/>
+          <a:lstStyle/>
+          <a:p>
+            <a:r>
+              <a:rPr lang="en-US" dirty="0" smtClean="0"/>
+              <a:t>Why is it a struggle to do this?</a:t>
+            </a:r>
+            <a:endParaRPr lang="en-US" dirty="0"/>
+          </a:p>
+        </p:txBody>
+      </p:sp>
+    </p:spTree>
+    <p:extLst>
+      <p:ext uri="{BB962C8B-B14F-4D97-AF65-F5344CB8AC3E}">
+        <p14:creationId xmlns:p14="http://schemas.microsoft.com/office/powerpoint/2010/main" val="623930801"/>
+      </p:ext>
+    </p:extLst>
+  </p:cSld>
+  <p:clrMapOvr>
+    <a:masterClrMapping/>
+  </p:clrMapOvr>
+</p:sld>
+</file>
+
+<file path=ppt/slides/slide5.xml><?xml version="1.0" encoding="utf-8"?>
+<p:sld xmlns:a="http://schemas.openxmlformats.org/drawingml/2006/main" xmlns:r="http://schemas.openxmlformats.org/officeDocument/2006/relationships" xmlns:p="http://schemas.openxmlformats.org/presentationml/2006/main">
+  <p:cSld>
+    <p:spTree>
+      <p:nvGrpSpPr>
+        <p:cNvPr id="1" name=""/>
+        <p:cNvGrpSpPr/>
+        <p:nvPr/>
+      </p:nvGrpSpPr>
+      <p:grpSpPr>
+        <a:xfrm>
+          <a:off x="0" y="0"/>
+          <a:ext cx="0" cy="0"/>
+          <a:chOff x="0" y="0"/>
+          <a:chExt cx="0" cy="0"/>
+        </a:xfrm>
+      </p:grpSpPr>
+      <p:sp>
+        <p:nvSpPr>
+          <p:cNvPr id="2" name="Title 1"/>
+          <p:cNvSpPr>
+            <a:spLocks noGrp="1"/>
+          </p:cNvSpPr>
+          <p:nvPr>
+            <p:ph type="title"/>
+          </p:nvPr>
+        </p:nvSpPr>
+        <p:spPr/>
+        <p:txBody>
+          <a:bodyPr/>
+          <a:lstStyle/>
+          <a:p>
+            <a:r>
+              <a:rPr lang="en-US" dirty="0" smtClean="0"/>
+              <a:t>How?</a:t>
+            </a:r>
+            <a:endParaRPr lang="en-US" dirty="0"/>
+          </a:p>
+        </p:txBody>
+      </p:sp>
+      <p:sp>
+        <p:nvSpPr>
+          <p:cNvPr id="3" name="Content Placeholder 2"/>
+          <p:cNvSpPr>
+            <a:spLocks noGrp="1"/>
+          </p:cNvSpPr>
+          <p:nvPr>
+            <p:ph idx="1"/>
+          </p:nvPr>
+        </p:nvSpPr>
+        <p:spPr/>
+        <p:txBody>
+          <a:bodyPr/>
+          <a:lstStyle/>
+          <a:p>
+            <a:r>
+              <a:rPr lang="en-US" dirty="0" smtClean="0"/>
+              <a:t>Summarize presentation</a:t>
+            </a:r>
+            <a:endParaRPr lang="en-US" dirty="0"/>
+          </a:p>
+        </p:txBody>
+      </p:sp>
+    </p:spTree>
+    <p:extLst>
+      <p:ext uri="{BB962C8B-B14F-4D97-AF65-F5344CB8AC3E}">
+        <p14:creationId xmlns:p14="http://schemas.microsoft.com/office/powerpoint/2010/main" val="567372212"/>
+      </p:ext>
+    </p:extLst>
+  </p:cSld>
+  <p:clrMapOvr>
+    <a:masterClrMapping/>
+  </p:clrMapOvr>
+</p:sld>
+</file>
+
+<file path=ppt/slides/slide6.xml><?xml version="1.0" encoding="utf-8"?>
+<p:sld xmlns:a="http://schemas.openxmlformats.org/drawingml/2006/main" xmlns:r="http://schemas.openxmlformats.org/officeDocument/2006/relationships" xmlns:p="http://schemas.openxmlformats.org/presentationml/2006/main">
+  <p:cSld>
+    <p:spTree>
+      <p:nvGrpSpPr>
+        <p:cNvPr id="1" name=""/>
+        <p:cNvGrpSpPr/>
+        <p:nvPr/>
+      </p:nvGrpSpPr>
+      <p:grpSpPr>
+        <a:xfrm>
+          <a:off x="0" y="0"/>
+          <a:ext cx="0" cy="0"/>
+          <a:chOff x="0" y="0"/>
+          <a:chExt cx="0" cy="0"/>
+        </a:xfrm>
+      </p:grpSpPr>
+      <p:sp>
+        <p:nvSpPr>
+          <p:cNvPr id="2" name="Title 1"/>
+          <p:cNvSpPr>
+            <a:spLocks noGrp="1"/>
+          </p:cNvSpPr>
+          <p:nvPr>
+            <p:ph type="title"/>
+          </p:nvPr>
+        </p:nvSpPr>
+        <p:spPr/>
+        <p:txBody>
+          <a:bodyPr/>
+          <a:lstStyle/>
+          <a:p>
+            <a:r>
+              <a:rPr lang="en-US" dirty="0" smtClean="0"/>
+              <a:t>Sample feature / system</a:t>
+            </a:r>
+            <a:endParaRPr lang="en-US" dirty="0"/>
+          </a:p>
+        </p:txBody>
+      </p:sp>
+      <p:sp>
+        <p:nvSpPr>
+          <p:cNvPr id="3" name="Content Placeholder 2"/>
+          <p:cNvSpPr>
+            <a:spLocks noGrp="1"/>
+          </p:cNvSpPr>
+          <p:nvPr>
+            <p:ph idx="1"/>
+          </p:nvPr>
+        </p:nvSpPr>
+        <p:spPr/>
+        <p:txBody>
+          <a:bodyPr/>
+          <a:lstStyle/>
+          <a:p>
+            <a:endParaRPr lang="en-US"/>
+          </a:p>
+        </p:txBody>
+      </p:sp>
+    </p:spTree>
+    <p:extLst>
+      <p:ext uri="{BB962C8B-B14F-4D97-AF65-F5344CB8AC3E}">
+        <p14:creationId xmlns:p14="http://schemas.microsoft.com/office/powerpoint/2010/main" val="1991789900"/>
+      </p:ext>
+    </p:extLst>
+  </p:cSld>
+  <p:clrMapOvr>
+    <a:masterClrMapping/>
+  </p:clrMapOvr>
+</p:sld>
+</file>
+
+<file path=ppt/slides/slide7.xml><?xml version="1.0" encoding="utf-8"?>
+<p:sld xmlns:a="http://schemas.openxmlformats.org/drawingml/2006/main" xmlns:r="http://schemas.openxmlformats.org/officeDocument/2006/relationships" xmlns:p="http://schemas.openxmlformats.org/presentationml/2006/main">
+  <p:cSld>
+    <p:spTree>
+      <p:nvGrpSpPr>
+        <p:cNvPr id="1" name=""/>
+        <p:cNvGrpSpPr/>
+        <p:nvPr/>
+      </p:nvGrpSpPr>
+      <p:grpSpPr>
+        <a:xfrm>
+          <a:off x="0" y="0"/>
+          <a:ext cx="0" cy="0"/>
+          <a:chOff x="0" y="0"/>
+          <a:chExt cx="0" cy="0"/>
+        </a:xfrm>
+      </p:grpSpPr>
+      <p:sp>
+        <p:nvSpPr>
+          <p:cNvPr id="2" name="Title 1"/>
+          <p:cNvSpPr>
+            <a:spLocks noGrp="1"/>
+          </p:cNvSpPr>
+          <p:nvPr>
+            <p:ph type="title"/>
+          </p:nvPr>
+        </p:nvSpPr>
+        <p:spPr/>
+        <p:txBody>
+          <a:bodyPr/>
+          <a:lstStyle/>
+          <a:p>
+            <a:r>
+              <a:rPr lang="en-US" dirty="0" smtClean="0"/>
+              <a:t>Planning</a:t>
+            </a:r>
+            <a:endParaRPr lang="en-US" dirty="0"/>
+          </a:p>
+        </p:txBody>
+      </p:sp>
+      <p:sp>
+        <p:nvSpPr>
+          <p:cNvPr id="3" name="Content Placeholder 2"/>
+          <p:cNvSpPr>
+            <a:spLocks noGrp="1"/>
+          </p:cNvSpPr>
+          <p:nvPr>
+            <p:ph idx="1"/>
+          </p:nvPr>
+        </p:nvSpPr>
+        <p:spPr/>
+        <p:txBody>
+          <a:bodyPr/>
+          <a:lstStyle/>
+          <a:p>
+            <a:endParaRPr lang="en-US"/>
+          </a:p>
+        </p:txBody>
+      </p:sp>
+    </p:spTree>
+    <p:extLst>
+      <p:ext uri="{BB962C8B-B14F-4D97-AF65-F5344CB8AC3E}">
+        <p14:creationId xmlns:p14="http://schemas.microsoft.com/office/powerpoint/2010/main" val="2111955063"/>
+      </p:ext>
+    </p:extLst>
+  </p:cSld>
+  <p:clrMapOvr>
+    <a:masterClrMapping/>
+  </p:clrMapOvr>
+</p:sld>
+</file>
+
+<file path=ppt/slides/slide8.xml><?xml version="1.0" encoding="utf-8"?>
+<p:sld xmlns:a="http://schemas.openxmlformats.org/drawingml/2006/main" xmlns:r="http://schemas.openxmlformats.org/officeDocument/2006/relationships" xmlns:p="http://schemas.openxmlformats.org/presentationml/2006/main">
+  <p:cSld>
+    <p:spTree>
+      <p:nvGrpSpPr>
+        <p:cNvPr id="1" name=""/>
+        <p:cNvGrpSpPr/>
+        <p:nvPr/>
+      </p:nvGrpSpPr>
+      <p:grpSpPr>
+        <a:xfrm>
+          <a:off x="0" y="0"/>
+          <a:ext cx="0" cy="0"/>
+          <a:chOff x="0" y="0"/>
+          <a:chExt cx="0" cy="0"/>
+        </a:xfrm>
+      </p:grpSpPr>
+      <p:sp>
+        <p:nvSpPr>
+          <p:cNvPr id="2" name="Title 1"/>
+          <p:cNvSpPr>
+            <a:spLocks noGrp="1"/>
+          </p:cNvSpPr>
+          <p:nvPr>
+            <p:ph type="title"/>
+          </p:nvPr>
+        </p:nvSpPr>
+        <p:spPr/>
+        <p:txBody>
+          <a:bodyPr/>
+          <a:lstStyle/>
+          <a:p>
+            <a:r>
+              <a:rPr lang="en-US" dirty="0" smtClean="0"/>
+              <a:t>Tasks / Tests</a:t>
+            </a:r>
+            <a:endParaRPr lang="en-US" dirty="0"/>
+          </a:p>
+        </p:txBody>
+      </p:sp>
+      <p:sp>
+        <p:nvSpPr>
+          <p:cNvPr id="3" name="Content Placeholder 2"/>
+          <p:cNvSpPr>
+            <a:spLocks noGrp="1"/>
+          </p:cNvSpPr>
+          <p:nvPr>
+            <p:ph idx="1"/>
+          </p:nvPr>
+        </p:nvSpPr>
+        <p:spPr/>
+        <p:txBody>
+          <a:bodyPr/>
+          <a:lstStyle/>
+          <a:p>
+            <a:endParaRPr lang="en-US"/>
+          </a:p>
+        </p:txBody>
+      </p:sp>
+    </p:spTree>
+    <p:extLst>
+      <p:ext uri="{BB962C8B-B14F-4D97-AF65-F5344CB8AC3E}">
+        <p14:creationId xmlns:p14="http://schemas.microsoft.com/office/powerpoint/2010/main" val="1254851648"/>
+      </p:ext>
+    </p:extLst>
+  </p:cSld>
+  <p:clrMapOvr>
+    <a:masterClrMapping/>
+  </p:clrMapOvr>
+</p:sld>
+</file>
+
+<file path=ppt/slides/slide9.xml><?xml version="1.0" encoding="utf-8"?>
+<p:sld xmlns:a="http://schemas.openxmlformats.org/drawingml/2006/main" xmlns:r="http://schemas.openxmlformats.org/officeDocument/2006/relationships" xmlns:p="http://schemas.openxmlformats.org/presentationml/2006/main">
+  <p:cSld>
+    <p:spTree>
+      <p:nvGrpSpPr>
+        <p:cNvPr id="1" name=""/>
+        <p:cNvGrpSpPr/>
+        <p:nvPr/>
+      </p:nvGrpSpPr>
+      <p:grpSpPr>
+        <a:xfrm>
+          <a:off x="0" y="0"/>
+          <a:ext cx="0" cy="0"/>
+          <a:chOff x="0" y="0"/>
+          <a:chExt cx="0" cy="0"/>
+        </a:xfrm>
+      </p:grpSpPr>
+      <p:sp>
+        <p:nvSpPr>
+          <p:cNvPr id="2" name="Title 1"/>
+          <p:cNvSpPr>
+            <a:spLocks noGrp="1"/>
+          </p:cNvSpPr>
+          <p:nvPr>
+            <p:ph type="title"/>
+          </p:nvPr>
+        </p:nvSpPr>
+        <p:spPr/>
+        <p:txBody>
+          <a:bodyPr/>
+          <a:lstStyle/>
+          <a:p>
+            <a:r>
+              <a:rPr lang="en-US" dirty="0" smtClean="0"/>
+              <a:t>Service Tests</a:t>
+            </a:r>
+            <a:endParaRPr lang="en-US" dirty="0"/>
+          </a:p>
+        </p:txBody>
+      </p:sp>
+      <p:sp>
+        <p:nvSpPr>
+          <p:cNvPr id="3" name="Content Placeholder 2"/>
+          <p:cNvSpPr>
+            <a:spLocks noGrp="1"/>
+          </p:cNvSpPr>
+          <p:nvPr>
+            <p:ph idx="1"/>
+          </p:nvPr>
+        </p:nvSpPr>
+        <p:spPr/>
+        <p:txBody>
+          <a:bodyPr/>
+          <a:lstStyle/>
+          <a:p>
+            <a:endParaRPr lang="en-US"/>
+          </a:p>
+        </p:txBody>
+      </p:sp>
+    </p:spTree>
+    <p:extLst>
+      <p:ext uri="{BB962C8B-B14F-4D97-AF65-F5344CB8AC3E}">
+        <p14:creationId xmlns:p14="http://schemas.microsoft.com/office/powerpoint/2010/main" val="1804738836"/>
       </p:ext>
     </p:extLst>
   </p:cSld>

</xml_diff>

<commit_message>
presentation updates, test changes
</commit_message>
<xml_diff>
--- a/Test Pyramid Presentation.pptx
+++ b/Test Pyramid Presentation.pptx
@@ -11,9 +11,9 @@
     <p:sldId id="256" r:id="rId2"/>
     <p:sldId id="257" r:id="rId3"/>
     <p:sldId id="258" r:id="rId4"/>
-    <p:sldId id="269" r:id="rId5"/>
-    <p:sldId id="260" r:id="rId6"/>
-    <p:sldId id="259" r:id="rId7"/>
+    <p:sldId id="260" r:id="rId5"/>
+    <p:sldId id="259" r:id="rId6"/>
+    <p:sldId id="269" r:id="rId7"/>
     <p:sldId id="262" r:id="rId8"/>
     <p:sldId id="263" r:id="rId9"/>
     <p:sldId id="265" r:id="rId10"/>
@@ -210,7 +210,7 @@
           <a:p>
             <a:fld id="{51E71193-F4DE-7347-96CF-6A9725F5B501}" type="datetimeFigureOut">
               <a:rPr lang="en-US" smtClean="0"/>
-              <a:t>7/18/17</a:t>
+              <a:t>7/27/17</a:t>
             </a:fld>
             <a:endParaRPr lang="en-US"/>
           </a:p>
@@ -522,7 +522,93 @@
           <a:bodyPr/>
           <a:lstStyle/>
           <a:p>
-            <a:endParaRPr lang="en-US" dirty="0"/>
+            <a:pPr marL="171450" indent="-171450">
+              <a:buFontTx/>
+              <a:buChar char="-"/>
+            </a:pPr>
+            <a:r>
+              <a:rPr lang="en-US" sz="1200" baseline="0" dirty="0" smtClean="0"/>
+              <a:t>Personal intro</a:t>
+            </a:r>
+          </a:p>
+          <a:p>
+            <a:pPr marL="171450" indent="-171450">
+              <a:buFontTx/>
+              <a:buChar char="-"/>
+            </a:pPr>
+            <a:r>
+              <a:rPr lang="en-US" sz="1200" baseline="0" dirty="0" smtClean="0"/>
+              <a:t>Hospital - testing is important</a:t>
+            </a:r>
+          </a:p>
+          <a:p>
+            <a:pPr marL="171450" indent="-171450">
+              <a:buFontTx/>
+              <a:buChar char="-"/>
+            </a:pPr>
+            <a:r>
+              <a:rPr lang="en-US" sz="1200" baseline="0" dirty="0" err="1" smtClean="0"/>
+              <a:t>Allistair</a:t>
+            </a:r>
+            <a:r>
+              <a:rPr lang="en-US" sz="1200" baseline="0" dirty="0" smtClean="0"/>
+              <a:t> Cockburn, 1999, Cockburn scale </a:t>
+            </a:r>
+            <a:r>
+              <a:rPr lang="mr-IN" sz="1200" baseline="0" dirty="0" smtClean="0"/>
+              <a:t>–</a:t>
+            </a:r>
+            <a:r>
+              <a:rPr lang="en-US" sz="1200" baseline="0" dirty="0" smtClean="0"/>
+              <a:t> criticality and number of people involved.  More critical = more publically visible correctness.</a:t>
+            </a:r>
+          </a:p>
+          <a:p>
+            <a:pPr marL="171450" indent="-171450">
+              <a:buFontTx/>
+              <a:buChar char="-"/>
+            </a:pPr>
+            <a:r>
+              <a:rPr lang="en-US" sz="1200" baseline="0" dirty="0" smtClean="0"/>
+              <a:t>True for us, layers of tests with many being visible to all team members or stakeholders are important.</a:t>
+            </a:r>
+          </a:p>
+          <a:p>
+            <a:pPr marL="171450" indent="-171450">
+              <a:buFontTx/>
+              <a:buChar char="-"/>
+            </a:pPr>
+            <a:r>
+              <a:rPr lang="en-US" sz="1200" baseline="0" dirty="0" smtClean="0"/>
+              <a:t>2009 </a:t>
+            </a:r>
+            <a:r>
+              <a:rPr lang="en-US" sz="1200" baseline="0" dirty="0" err="1" smtClean="0"/>
+              <a:t>Succeding</a:t>
+            </a:r>
+            <a:r>
+              <a:rPr lang="en-US" sz="1200" baseline="0" dirty="0" smtClean="0"/>
+              <a:t> with Agile, Mike Cohn’s Test Pyramid </a:t>
+            </a:r>
+            <a:r>
+              <a:rPr lang="mr-IN" sz="1200" baseline="0" dirty="0" smtClean="0"/>
+              <a:t>–</a:t>
+            </a:r>
+            <a:r>
+              <a:rPr lang="en-US" sz="1200" baseline="0" dirty="0" smtClean="0"/>
+              <a:t> how many familiar.  </a:t>
+            </a:r>
+          </a:p>
+          <a:p>
+            <a:pPr marL="171450" indent="-171450">
+              <a:buFontTx/>
+              <a:buChar char="-"/>
+            </a:pPr>
+            <a:r>
+              <a:rPr lang="en-US" sz="1200" baseline="0" dirty="0" smtClean="0"/>
+              <a:t>Not just talk about, look at implementation for an application, how to achieve.</a:t>
+            </a:r>
+            <a:endParaRPr lang="en-US" sz="1200" dirty="0"/>
           </a:p>
         </p:txBody>
       </p:sp>
@@ -633,7 +719,11 @@
             </a:r>
             <a:r>
               <a:rPr lang="en-US" baseline="0" dirty="0" smtClean="0"/>
-              <a:t> test covers a wide variety of parsing scenarios.</a:t>
+              <a:t> test covers a wide variety of parsing scenarios</a:t>
+            </a:r>
+            <a:r>
+              <a:rPr lang="en-US" baseline="0" dirty="0" smtClean="0"/>
+              <a:t>.</a:t>
             </a:r>
           </a:p>
           <a:p>
@@ -656,6 +746,30 @@
             </a:pPr>
             <a:r>
               <a:rPr lang="en-US" baseline="0" dirty="0" smtClean="0"/>
+              <a:t>Switch to code</a:t>
+            </a:r>
+            <a:endParaRPr lang="en-US" baseline="0" dirty="0" smtClean="0"/>
+          </a:p>
+          <a:p>
+            <a:pPr marL="171450" marR="0" indent="-171450" algn="l" defTabSz="914400" rtl="0" eaLnBrk="1" fontAlgn="auto" latinLnBrk="0" hangingPunct="1">
+              <a:lnSpc>
+                <a:spcPct val="100000"/>
+              </a:lnSpc>
+              <a:spcBef>
+                <a:spcPts val="0"/>
+              </a:spcBef>
+              <a:spcAft>
+                <a:spcPts val="0"/>
+              </a:spcAft>
+              <a:buClrTx/>
+              <a:buSzTx/>
+              <a:buFont typeface="Arial" charset="0"/>
+              <a:buChar char="•"/>
+              <a:tabLst/>
+              <a:defRPr/>
+            </a:pPr>
+            <a:r>
+              <a:rPr lang="en-US" baseline="0" dirty="0" smtClean="0"/>
               <a:t>Two classes provide the implementation for this part of the feature, </a:t>
             </a:r>
             <a:r>
@@ -676,11 +790,23 @@
             </a:r>
             <a:r>
               <a:rPr lang="en-US" baseline="0" dirty="0" err="1" smtClean="0"/>
-              <a:t>EDurationUnit</a:t>
+              <a:t>EDurationUnitShould</a:t>
             </a:r>
             <a:r>
               <a:rPr lang="en-US" baseline="0" dirty="0" smtClean="0"/>
-              <a:t> test verifies how duration units are expressed.  The test for </a:t>
+              <a:t> </a:t>
+            </a:r>
+            <a:r>
+              <a:rPr lang="en-US" baseline="0" dirty="0" smtClean="0"/>
+              <a:t>verifies how duration units are </a:t>
+            </a:r>
+            <a:r>
+              <a:rPr lang="en-US" baseline="0" dirty="0" smtClean="0"/>
+              <a:t>expressed and multiplier.  </a:t>
+            </a:r>
+            <a:r>
+              <a:rPr lang="en-US" baseline="0" dirty="0" smtClean="0"/>
+              <a:t>The test for </a:t>
             </a:r>
             <a:r>
               <a:rPr lang="en-US" baseline="0" dirty="0" err="1" smtClean="0"/>
@@ -816,7 +942,27 @@
             </a:r>
             <a:r>
               <a:rPr lang="en-US" baseline="0" dirty="0" smtClean="0"/>
-              <a:t> test covers a full range of cases which will both pass and fail the validation rule.  It depends on both opiate identification and duration parsing logic.</a:t>
+              <a:t> test covers </a:t>
+            </a:r>
+            <a:r>
+              <a:rPr lang="en-US" baseline="0" dirty="0" smtClean="0"/>
+              <a:t>wide range of </a:t>
+            </a:r>
+            <a:r>
+              <a:rPr lang="en-US" baseline="0" dirty="0" smtClean="0"/>
+              <a:t>cases which will both pass and fail the validation rule.  </a:t>
+            </a:r>
+            <a:r>
+              <a:rPr lang="en-US" baseline="0" smtClean="0"/>
+              <a:t>It </a:t>
+            </a:r>
+            <a:r>
+              <a:rPr lang="en-US" baseline="0" smtClean="0"/>
+              <a:t>relies on both opiate </a:t>
+            </a:r>
+            <a:r>
+              <a:rPr lang="en-US" baseline="0" dirty="0" smtClean="0"/>
+              <a:t>identification and duration parsing logic.</a:t>
             </a:r>
           </a:p>
           <a:p>
@@ -1310,27 +1456,63 @@
           <a:bodyPr/>
           <a:lstStyle/>
           <a:p>
+            <a:pPr marL="171450" indent="-171450">
+              <a:buFontTx/>
+              <a:buChar char="-"/>
+            </a:pPr>
             <a:r>
               <a:rPr lang="en-US" dirty="0" smtClean="0"/>
-              <a:t>Automated test</a:t>
+              <a:t>Strategy of automated </a:t>
+            </a:r>
+            <a:r>
+              <a:rPr lang="en-US" dirty="0" smtClean="0"/>
+              <a:t>test</a:t>
             </a:r>
             <a:r>
               <a:rPr lang="en-US" baseline="0" dirty="0" smtClean="0"/>
-              <a:t> distribution by purpose and type.</a:t>
-            </a:r>
-            <a:endParaRPr lang="en-US" dirty="0" smtClean="0"/>
-          </a:p>
-          <a:p>
-            <a:endParaRPr lang="en-US" dirty="0" smtClean="0"/>
-          </a:p>
-          <a:p>
+              <a:t> distribution by purpose and </a:t>
+            </a:r>
+            <a:r>
+              <a:rPr lang="en-US" baseline="0" dirty="0" smtClean="0"/>
+              <a:t>type.</a:t>
+            </a:r>
+          </a:p>
+          <a:p>
+            <a:pPr marL="171450" indent="-171450">
+              <a:buFontTx/>
+              <a:buChar char="-"/>
+            </a:pPr>
+            <a:r>
+              <a:rPr lang="en-US" baseline="0" dirty="0" smtClean="0"/>
+              <a:t>Describe levels.</a:t>
+            </a:r>
+          </a:p>
+          <a:p>
+            <a:pPr marL="171450" indent="-171450">
+              <a:buFontTx/>
+              <a:buChar char="-"/>
+            </a:pPr>
+            <a:r>
+              <a:rPr lang="en-US" baseline="0" dirty="0" smtClean="0"/>
+              <a:t>UI testing described here by Cohn is end-end style tests, not unit tests of the UI.</a:t>
+            </a:r>
+          </a:p>
+          <a:p>
+            <a:pPr marL="171450" indent="-171450">
+              <a:buFontTx/>
+              <a:buChar char="-"/>
+            </a:pPr>
             <a:r>
               <a:rPr lang="en-US" dirty="0" smtClean="0"/>
               <a:t>Google</a:t>
             </a:r>
             <a:r>
               <a:rPr lang="en-US" baseline="0" dirty="0" smtClean="0"/>
-              <a:t> has similar concept for testing </a:t>
+              <a:t> </a:t>
+            </a:r>
+            <a:r>
+              <a:rPr lang="en-US" baseline="0" dirty="0" smtClean="0"/>
+              <a:t>has similar concept for testing </a:t>
             </a:r>
             <a:r>
               <a:rPr lang="mr-IN" baseline="0" dirty="0" smtClean="0"/>
@@ -1424,6 +1606,10 @@
           <a:bodyPr/>
           <a:lstStyle/>
           <a:p>
+            <a:r>
+              <a:rPr lang="en-US" dirty="0" smtClean="0"/>
+              <a:t>Testing everything through the UI was the norm at one time.</a:t>
+            </a:r>
             <a:endParaRPr lang="en-US" dirty="0"/>
           </a:p>
         </p:txBody>
@@ -1508,21 +1694,28 @@
           <a:bodyPr/>
           <a:lstStyle/>
           <a:p>
+            <a:endParaRPr lang="en-US" dirty="0" smtClean="0"/>
+          </a:p>
+          <a:p>
+            <a:pPr marL="171450" indent="-171450">
+              <a:buFontTx/>
+              <a:buChar char="-"/>
+            </a:pPr>
             <a:r>
               <a:rPr lang="en-US" dirty="0" smtClean="0"/>
-              <a:t>Service </a:t>
-            </a:r>
-            <a:r>
-              <a:rPr lang="mr-IN" dirty="0" smtClean="0"/>
-              <a:t>–</a:t>
+              <a:t>Not</a:t>
+            </a:r>
+            <a:r>
+              <a:rPr lang="en-US" baseline="0" dirty="0" smtClean="0"/>
+              <a:t> accident</a:t>
             </a:r>
             <a:r>
               <a:rPr lang="en-US" dirty="0" smtClean="0"/>
-              <a:t> business</a:t>
+              <a:t>.  What exact</a:t>
             </a:r>
             <a:r>
               <a:rPr lang="en-US" baseline="0" dirty="0" smtClean="0"/>
-              <a:t> logic of application </a:t>
+              <a:t> layers, what purpose, what tools, who authors, at what point in the iteration </a:t>
             </a:r>
             <a:r>
               <a:rPr lang="mr-IN" baseline="0" dirty="0" smtClean="0"/>
@@ -1530,72 +1723,45 @@
             </a:r>
             <a:r>
               <a:rPr lang="en-US" baseline="0" dirty="0" smtClean="0"/>
-              <a:t> responds to inputs with outputs.  (Calculator example from Cohn article).</a:t>
+              <a:t> all </a:t>
+            </a:r>
+            <a:r>
+              <a:rPr lang="en-US" baseline="0" dirty="0" err="1" smtClean="0"/>
+              <a:t>requies</a:t>
+            </a:r>
+            <a:r>
+              <a:rPr lang="en-US" baseline="0" dirty="0" smtClean="0"/>
+              <a:t> planning</a:t>
+            </a:r>
+          </a:p>
+          <a:p>
+            <a:pPr marL="171450" indent="-171450">
+              <a:buFontTx/>
+              <a:buChar char="-"/>
+            </a:pPr>
+            <a:r>
+              <a:rPr lang="en-US" baseline="0" dirty="0" smtClean="0"/>
+              <a:t>Everyone on team needs to have a common understanding</a:t>
+            </a:r>
+          </a:p>
+          <a:p>
+            <a:pPr marL="171450" indent="-171450">
+              <a:buFontTx/>
+              <a:buChar char="-"/>
+            </a:pPr>
+            <a:r>
+              <a:rPr lang="en-US" baseline="0" dirty="0" smtClean="0"/>
+              <a:t>Have to collaborate </a:t>
+            </a:r>
+            <a:r>
+              <a:rPr lang="mr-IN" baseline="0" dirty="0" smtClean="0"/>
+              <a:t>–</a:t>
+            </a:r>
+            <a:r>
+              <a:rPr lang="en-US" baseline="0" dirty="0" smtClean="0"/>
+              <a:t> avoid gaps and duplication</a:t>
             </a:r>
             <a:endParaRPr lang="en-US" dirty="0" smtClean="0"/>
-          </a:p>
-          <a:p>
-            <a:pPr marL="0" marR="0" indent="0" algn="l" defTabSz="914400" rtl="0" eaLnBrk="1" fontAlgn="auto" latinLnBrk="0" hangingPunct="1">
-              <a:lnSpc>
-                <a:spcPct val="100000"/>
-              </a:lnSpc>
-              <a:spcBef>
-                <a:spcPts val="0"/>
-              </a:spcBef>
-              <a:spcAft>
-                <a:spcPts val="0"/>
-              </a:spcAft>
-              <a:buClrTx/>
-              <a:buSzTx/>
-              <a:buFontTx/>
-              <a:buNone/>
-              <a:tabLst/>
-              <a:defRPr/>
-            </a:pPr>
-            <a:r>
-              <a:rPr lang="en-US" dirty="0" smtClean="0"/>
-              <a:t>Cohn, 2009:</a:t>
-            </a:r>
-            <a:r>
-              <a:rPr lang="en-US" baseline="0" dirty="0" smtClean="0"/>
-              <a:t>  “</a:t>
-            </a:r>
-            <a:r>
-              <a:rPr lang="en-US" sz="1200" b="0" i="0" kern="1200" dirty="0" smtClean="0">
-                <a:solidFill>
-                  <a:schemeClr val="tx1"/>
-                </a:solidFill>
-                <a:effectLst/>
-                <a:latin typeface="+mn-lt"/>
-                <a:ea typeface="+mn-ea"/>
-                <a:cs typeface="+mn-cs"/>
-              </a:rPr>
-              <a:t>a service is something the application does in response to some input or set of inputs.”</a:t>
-            </a:r>
-            <a:endParaRPr lang="en-US" dirty="0" smtClean="0"/>
-          </a:p>
-          <a:p>
-            <a:pPr marL="0" marR="0" indent="0" algn="l" defTabSz="914400" rtl="0" eaLnBrk="1" fontAlgn="auto" latinLnBrk="0" hangingPunct="1">
-              <a:lnSpc>
-                <a:spcPct val="100000"/>
-              </a:lnSpc>
-              <a:spcBef>
-                <a:spcPts val="0"/>
-              </a:spcBef>
-              <a:spcAft>
-                <a:spcPts val="0"/>
-              </a:spcAft>
-              <a:buClrTx/>
-              <a:buSzTx/>
-              <a:buFontTx/>
-              <a:buNone/>
-              <a:tabLst/>
-              <a:defRPr/>
-            </a:pPr>
-            <a:r>
-              <a:rPr lang="en-US" dirty="0" smtClean="0"/>
-              <a:t>Orthogonal Concepts: Integration Tests, End to End tests.  Decide what the above layers mean to your team.</a:t>
-            </a:r>
           </a:p>
         </p:txBody>
       </p:sp>
@@ -1625,7 +1791,7 @@
     </p:spTree>
     <p:extLst>
       <p:ext uri="{BB962C8B-B14F-4D97-AF65-F5344CB8AC3E}">
-        <p14:creationId xmlns:p14="http://schemas.microsoft.com/office/powerpoint/2010/main" val="1643938883"/>
+        <p14:creationId xmlns:p14="http://schemas.microsoft.com/office/powerpoint/2010/main" val="148475727"/>
       </p:ext>
     </p:extLst>
   </p:cSld>
@@ -1679,40 +1845,40 @@
           <a:bodyPr/>
           <a:lstStyle/>
           <a:p>
+            <a:pPr marL="171450" indent="-171450">
+              <a:buFont typeface="Arial" charset="0"/>
+              <a:buChar char="•"/>
+            </a:pPr>
             <a:r>
               <a:rPr lang="en-US" dirty="0" smtClean="0"/>
-              <a:t>Not going to happen by happy accident.  What tools will be used, how to divvy up test coverage</a:t>
+              <a:t>Look</a:t>
             </a:r>
             <a:r>
               <a:rPr lang="en-US" baseline="0" dirty="0" smtClean="0"/>
-              <a:t> for a feature across those tools without gaps or duplication </a:t>
-            </a:r>
-            <a:r>
-              <a:rPr lang="mr-IN" baseline="0" dirty="0" smtClean="0"/>
-              <a:t>–</a:t>
-            </a:r>
+              <a:t> at code and test for sample application, how they fit into our intentional testing layers.</a:t>
+            </a:r>
+            <a:endParaRPr lang="en-US" dirty="0" smtClean="0"/>
+          </a:p>
+          <a:p>
+            <a:pPr marL="171450" indent="-171450">
+              <a:buFont typeface="Arial" charset="0"/>
+              <a:buChar char="•"/>
+            </a:pPr>
+            <a:r>
+              <a:rPr lang="en-US" dirty="0" smtClean="0"/>
+              <a:t>Very small but contains real world feature from real prescribing application</a:t>
+            </a:r>
+          </a:p>
+          <a:p>
+            <a:pPr marL="171450" indent="-171450">
+              <a:buFont typeface="Arial" charset="0"/>
+              <a:buChar char="•"/>
+            </a:pPr>
             <a:r>
               <a:rPr lang="en-US" baseline="0" dirty="0" smtClean="0"/>
-              <a:t> all requires intentional work and communication.</a:t>
-            </a:r>
-          </a:p>
-          <a:p>
+              <a:t>Web app with a back-end service layer</a:t>
+            </a:r>
             <a:endParaRPr lang="en-US" baseline="0" dirty="0" smtClean="0"/>
-          </a:p>
-          <a:p>
-            <a:r>
-              <a:rPr lang="en-US" baseline="0" dirty="0" smtClean="0"/>
-              <a:t>This presentation:  Look at sample app based on real-world clinical application and its tests </a:t>
-            </a:r>
-            <a:r>
-              <a:rPr lang="mr-IN" baseline="0" dirty="0" smtClean="0"/>
-              <a:t>–</a:t>
-            </a:r>
-            <a:r>
-              <a:rPr lang="en-US" baseline="0" dirty="0" smtClean="0"/>
-              <a:t> see how pyramid constructed, discuss process and tools that were used for real application’s tests.</a:t>
-            </a:r>
-            <a:endParaRPr lang="en-US" dirty="0"/>
           </a:p>
         </p:txBody>
       </p:sp>
@@ -1742,7 +1908,7 @@
     </p:spTree>
     <p:extLst>
       <p:ext uri="{BB962C8B-B14F-4D97-AF65-F5344CB8AC3E}">
-        <p14:creationId xmlns:p14="http://schemas.microsoft.com/office/powerpoint/2010/main" val="148475727"/>
+        <p14:creationId xmlns:p14="http://schemas.microsoft.com/office/powerpoint/2010/main" val="766374"/>
       </p:ext>
     </p:extLst>
   </p:cSld>
@@ -1796,47 +1962,106 @@
           <a:bodyPr/>
           <a:lstStyle/>
           <a:p>
-            <a:pPr marL="171450" indent="-171450">
-              <a:buFont typeface="Arial" charset="0"/>
-              <a:buChar char="•"/>
+            <a:r>
+              <a:rPr lang="en-US" dirty="0" smtClean="0"/>
+              <a:t>- Roughly how tests were </a:t>
+            </a:r>
+            <a:r>
+              <a:rPr lang="en-US" dirty="0" err="1" smtClean="0"/>
+              <a:t>implented</a:t>
+            </a:r>
+            <a:r>
+              <a:rPr lang="en-US" baseline="0" dirty="0" smtClean="0"/>
+              <a:t> in the real application sample is based on</a:t>
+            </a:r>
+            <a:endParaRPr lang="en-US" dirty="0" smtClean="0"/>
+          </a:p>
+          <a:p>
+            <a:r>
+              <a:rPr lang="en-US" dirty="0" smtClean="0"/>
+              <a:t>(Customers</a:t>
+            </a:r>
+            <a:r>
+              <a:rPr lang="en-US" baseline="0" dirty="0" smtClean="0"/>
+              <a:t> </a:t>
+            </a:r>
+            <a:r>
+              <a:rPr lang="mr-IN" baseline="0" dirty="0" smtClean="0"/>
+              <a:t>–</a:t>
+            </a:r>
+            <a:r>
+              <a:rPr lang="en-US" baseline="0" dirty="0" smtClean="0"/>
+              <a:t> anyone not writing production code, includes QA, BA, customers.)</a:t>
+            </a:r>
+          </a:p>
+          <a:p>
+            <a:r>
+              <a:rPr lang="en-US" baseline="0" dirty="0" err="1" smtClean="0"/>
+              <a:t>Fitnesse</a:t>
+            </a:r>
+            <a:r>
+              <a:rPr lang="en-US" baseline="0" dirty="0" smtClean="0"/>
+              <a:t> chosen to provide high visibility of business logic tests to customers, and to drive feature development </a:t>
+            </a:r>
+            <a:r>
+              <a:rPr lang="mr-IN" baseline="0" dirty="0" smtClean="0"/>
+              <a:t>–</a:t>
+            </a:r>
+            <a:r>
+              <a:rPr lang="en-US" baseline="0" dirty="0" smtClean="0"/>
+              <a:t> tended to be written ahead of assigning feature to developers.</a:t>
+            </a:r>
+          </a:p>
+          <a:p>
+            <a:r>
+              <a:rPr lang="en-US" baseline="0" dirty="0" smtClean="0"/>
+              <a:t>- Not necessarily a complete picture of all the types of tests you may need to have for a particular app </a:t>
+            </a:r>
+            <a:r>
+              <a:rPr lang="mr-IN" baseline="0" dirty="0" smtClean="0"/>
+              <a:t>–</a:t>
+            </a:r>
+            <a:r>
+              <a:rPr lang="en-US" baseline="0" dirty="0" smtClean="0"/>
+              <a:t> pyramid is a general recommendation on overall test distribution.</a:t>
+            </a:r>
+          </a:p>
+          <a:p>
+            <a:pPr marL="0" marR="0" indent="0" algn="l" defTabSz="914400" rtl="0" eaLnBrk="1" fontAlgn="auto" latinLnBrk="0" hangingPunct="1">
+              <a:lnSpc>
+                <a:spcPct val="100000"/>
+              </a:lnSpc>
+              <a:spcBef>
+                <a:spcPts val="0"/>
+              </a:spcBef>
+              <a:spcAft>
+                <a:spcPts val="0"/>
+              </a:spcAft>
+              <a:buClrTx/>
+              <a:buSzTx/>
+              <a:buFontTx/>
+              <a:buNone/>
+              <a:tabLst/>
+              <a:defRPr/>
             </a:pPr>
             <a:r>
-              <a:rPr lang="en-US" dirty="0" smtClean="0"/>
-              <a:t>Testing crucial for clinical applications at VUMC </a:t>
-            </a:r>
-            <a:r>
-              <a:rPr lang="mr-IN" dirty="0" smtClean="0"/>
-              <a:t>–</a:t>
-            </a:r>
-            <a:r>
-              <a:rPr lang="en-US" dirty="0" smtClean="0"/>
-              <a:t> apps are used directly for patient care.  </a:t>
-            </a:r>
-          </a:p>
-          <a:p>
-            <a:pPr marL="171450" indent="-171450">
-              <a:buFont typeface="Arial" charset="0"/>
-              <a:buChar char="•"/>
-            </a:pPr>
-            <a:r>
-              <a:rPr lang="en-US" dirty="0" smtClean="0"/>
-              <a:t>Spend a lot of time thinking about testing</a:t>
-            </a:r>
-            <a:r>
               <a:rPr lang="en-US" baseline="0" dirty="0" smtClean="0"/>
-              <a:t> strategies, tools, improving automation.  </a:t>
-            </a:r>
-          </a:p>
-          <a:p>
-            <a:pPr marL="171450" indent="-171450">
-              <a:buFont typeface="Arial" charset="0"/>
-              <a:buChar char="•"/>
-            </a:pPr>
+              <a:t>- Micro Service </a:t>
+            </a:r>
+            <a:r>
+              <a:rPr lang="en-US" baseline="0" dirty="0" err="1" smtClean="0"/>
+              <a:t>api</a:t>
+            </a:r>
             <a:r>
               <a:rPr lang="en-US" baseline="0" dirty="0" smtClean="0"/>
-              <a:t>Sample prescribing web app, derived from real app, only has one feature, but shows some of this care and intention regarding testing.</a:t>
-            </a:r>
-            <a:endParaRPr lang="en-US" dirty="0"/>
+              <a:t> end-end smoke tests, for example.</a:t>
+            </a:r>
+          </a:p>
+          <a:p>
+            <a:r>
+              <a:rPr lang="en-US" baseline="0" dirty="0" smtClean="0"/>
+              <a:t>- Discussing and creating a grid of your test strategy in and of itself is useful.</a:t>
+            </a:r>
           </a:p>
         </p:txBody>
       </p:sp>
@@ -1866,7 +2091,7 @@
     </p:spTree>
     <p:extLst>
       <p:ext uri="{BB962C8B-B14F-4D97-AF65-F5344CB8AC3E}">
-        <p14:creationId xmlns:p14="http://schemas.microsoft.com/office/powerpoint/2010/main" val="766374"/>
+        <p14:creationId xmlns:p14="http://schemas.microsoft.com/office/powerpoint/2010/main" val="1643938883"/>
       </p:ext>
     </p:extLst>
   </p:cSld>
@@ -1922,12 +2147,46 @@
           <a:p>
             <a:r>
               <a:rPr lang="en-US" dirty="0" smtClean="0"/>
-              <a:t>Simple feature to state, but there</a:t>
+              <a:t>- To illustrate </a:t>
+            </a:r>
+            <a:r>
+              <a:rPr lang="en-US" dirty="0" err="1" smtClean="0"/>
+              <a:t>pyramic</a:t>
+            </a:r>
+            <a:r>
+              <a:rPr lang="en-US" dirty="0" smtClean="0"/>
+              <a:t>-style</a:t>
             </a:r>
             <a:r>
               <a:rPr lang="en-US" baseline="0" dirty="0" smtClean="0"/>
-              <a:t> are a number of aspects to implement.</a:t>
-            </a:r>
+              <a:t> layer of tests, we’ll look at tests for a particular feature</a:t>
+            </a:r>
+            <a:endParaRPr lang="en-US" dirty="0" smtClean="0"/>
+          </a:p>
+          <a:p>
+            <a:r>
+              <a:rPr lang="en-US" dirty="0" smtClean="0"/>
+              <a:t>- Simple </a:t>
+            </a:r>
+            <a:r>
+              <a:rPr lang="en-US" dirty="0" smtClean="0"/>
+              <a:t>feature to state, but there</a:t>
+            </a:r>
+            <a:r>
+              <a:rPr lang="en-US" baseline="0" dirty="0" smtClean="0"/>
+              <a:t> are a number of aspects to implement</a:t>
+            </a:r>
+            <a:r>
+              <a:rPr lang="en-US" baseline="0" dirty="0" smtClean="0"/>
+              <a:t>.</a:t>
+            </a:r>
+          </a:p>
+          <a:p>
+            <a:r>
+              <a:rPr lang="en-US" baseline="0" dirty="0" smtClean="0"/>
+              <a:t>- What are parts we need to implement?</a:t>
+            </a:r>
+            <a:endParaRPr lang="en-US" baseline="0" dirty="0" smtClean="0"/>
           </a:p>
           <a:p>
             <a:pPr marL="171450" indent="-171450">
@@ -1936,7 +2195,11 @@
             </a:pPr>
             <a:r>
               <a:rPr lang="en-US" baseline="0" dirty="0" smtClean="0"/>
-              <a:t>Must identify opiates</a:t>
+              <a:t>identify </a:t>
+            </a:r>
+            <a:r>
+              <a:rPr lang="en-US" baseline="0" dirty="0" smtClean="0"/>
+              <a:t>opiates</a:t>
             </a:r>
           </a:p>
           <a:p>
@@ -1946,8 +2209,13 @@
             </a:pPr>
             <a:r>
               <a:rPr lang="en-US" baseline="0" dirty="0" smtClean="0"/>
-              <a:t>Must recognize number of days from text entered by user</a:t>
-            </a:r>
+              <a:t>Calculate number </a:t>
+            </a:r>
+            <a:r>
+              <a:rPr lang="en-US" baseline="0" dirty="0" smtClean="0"/>
+              <a:t>of days from text </a:t>
+            </a:r>
+            <a:endParaRPr lang="en-US" baseline="0" dirty="0" smtClean="0"/>
           </a:p>
           <a:p>
             <a:pPr marL="171450" indent="-171450">
@@ -1956,7 +2224,19 @@
             </a:pPr>
             <a:r>
               <a:rPr lang="en-US" baseline="0" dirty="0" smtClean="0"/>
-              <a:t>Must apply business rule based on these two components and inform user</a:t>
+              <a:t>apply </a:t>
+            </a:r>
+            <a:r>
+              <a:rPr lang="en-US" baseline="0" dirty="0" smtClean="0"/>
+              <a:t>business rule based on </a:t>
+            </a:r>
+            <a:r>
+              <a:rPr lang="en-US" baseline="0" dirty="0" smtClean="0"/>
+              <a:t>above and </a:t>
+            </a:r>
+            <a:r>
+              <a:rPr lang="en-US" baseline="0" dirty="0" smtClean="0"/>
+              <a:t>inform user</a:t>
             </a:r>
           </a:p>
           <a:p>
@@ -2051,24 +2331,6 @@
           <a:bodyPr/>
           <a:lstStyle/>
           <a:p>
-            <a:r>
-              <a:rPr lang="en-US" dirty="0" smtClean="0"/>
-              <a:t>Team</a:t>
-            </a:r>
-            <a:r>
-              <a:rPr lang="en-US" baseline="0" dirty="0" smtClean="0"/>
-              <a:t> for real application often discussed testing details </a:t>
-            </a:r>
-            <a:r>
-              <a:rPr lang="mr-IN" baseline="0" dirty="0" smtClean="0"/>
-              <a:t>–</a:t>
-            </a:r>
-            <a:r>
-              <a:rPr lang="en-US" baseline="0" dirty="0" smtClean="0"/>
-              <a:t> what will be tested in which medium, authored by whom.</a:t>
-            </a:r>
-          </a:p>
-          <a:p>
             <a:endParaRPr lang="en-US" baseline="0" dirty="0" smtClean="0"/>
           </a:p>
           <a:p>
@@ -2114,36 +2376,9 @@
           <a:p>
             <a:r>
               <a:rPr lang="en-US" baseline="0" dirty="0" smtClean="0"/>
-              <a:t>The testing tools at each level were ones used by real application team </a:t>
-            </a:r>
-            <a:r>
-              <a:rPr lang="mr-IN" baseline="0" dirty="0" smtClean="0"/>
-              <a:t>–</a:t>
-            </a:r>
-            <a:r>
-              <a:rPr lang="en-US" baseline="0" dirty="0" smtClean="0"/>
-              <a:t> note that tools don’t dictate level / granularity of tests </a:t>
-            </a:r>
-            <a:r>
-              <a:rPr lang="mr-IN" baseline="0" dirty="0" smtClean="0"/>
-              <a:t>–</a:t>
-            </a:r>
-            <a:r>
-              <a:rPr lang="en-US" baseline="0" dirty="0" smtClean="0"/>
-              <a:t> all three could be done with unit testing tool.  </a:t>
-            </a:r>
-            <a:r>
-              <a:rPr lang="en-US" baseline="0" dirty="0" err="1" smtClean="0"/>
-              <a:t>Fitnesse</a:t>
-            </a:r>
-            <a:r>
-              <a:rPr lang="en-US" baseline="0" dirty="0" smtClean="0"/>
-              <a:t> is chosen for service testing by this team due to visibility and participation of customers</a:t>
-            </a:r>
-            <a:r>
-              <a:rPr lang="en-US" baseline="0" dirty="0" smtClean="0"/>
-              <a:t>.</a:t>
-            </a:r>
+              <a:t>Intentional distribution of tests for the feature.</a:t>
+            </a:r>
+            <a:endParaRPr lang="en-US" baseline="0" dirty="0" smtClean="0"/>
           </a:p>
           <a:p>
             <a:endParaRPr lang="en-US" baseline="0" dirty="0" smtClean="0"/>
@@ -2251,8 +2486,55 @@
               <a:defRPr/>
             </a:pPr>
             <a:r>
+              <a:rPr lang="en-US" baseline="0" dirty="0" err="1" smtClean="0"/>
+              <a:t>Fitnesse</a:t>
+            </a:r>
+            <a:r>
               <a:rPr lang="en-US" baseline="0" dirty="0" smtClean="0"/>
-              <a:t>The </a:t>
+              <a:t> tests:  full spec - each </a:t>
+            </a:r>
+            <a:r>
+              <a:rPr lang="en-US" baseline="0" dirty="0" smtClean="0"/>
+              <a:t>drug classification that should be considered an opiate</a:t>
+            </a:r>
+            <a:r>
+              <a:rPr lang="en-US" baseline="0" dirty="0" smtClean="0"/>
+              <a:t>.  Exact match </a:t>
+            </a:r>
+            <a:r>
+              <a:rPr lang="mr-IN" baseline="0" dirty="0" smtClean="0"/>
+              <a:t>–</a:t>
+            </a:r>
+            <a:r>
+              <a:rPr lang="en-US" baseline="0" dirty="0" smtClean="0"/>
+              <a:t> extra class by code fails, missing class fails.</a:t>
+            </a:r>
+          </a:p>
+          <a:p>
+            <a:pPr marL="171450" marR="0" indent="-171450" algn="l" defTabSz="914400" rtl="0" eaLnBrk="1" fontAlgn="auto" latinLnBrk="0" hangingPunct="1">
+              <a:lnSpc>
+                <a:spcPct val="100000"/>
+              </a:lnSpc>
+              <a:spcBef>
+                <a:spcPts val="0"/>
+              </a:spcBef>
+              <a:spcAft>
+                <a:spcPts val="0"/>
+              </a:spcAft>
+              <a:buClrTx/>
+              <a:buSzTx/>
+              <a:buFont typeface="Arial" charset="0"/>
+              <a:buChar char="•"/>
+              <a:tabLst/>
+              <a:defRPr/>
+            </a:pPr>
+            <a:r>
+              <a:rPr lang="en-US" baseline="0" dirty="0" err="1" smtClean="0"/>
+              <a:t>OpiateDrugConcept</a:t>
+            </a:r>
+            <a:r>
+              <a:rPr lang="en-US" baseline="0" dirty="0" smtClean="0"/>
+              <a:t> is class in our system responsible for this determination, unit tests verify logic of this unit of code without duplicating information in the </a:t>
             </a:r>
             <a:r>
               <a:rPr lang="en-US" baseline="0" dirty="0" err="1" smtClean="0"/>
@@ -2260,22 +2542,57 @@
             </a:r>
             <a:r>
               <a:rPr lang="en-US" baseline="0" dirty="0" smtClean="0"/>
-              <a:t> tests covers the full requirements for this part of the feature </a:t>
-            </a:r>
-            <a:r>
-              <a:rPr lang="mr-IN" baseline="0" dirty="0" smtClean="0"/>
-              <a:t>–</a:t>
-            </a:r>
-            <a:r>
-              <a:rPr lang="en-US" baseline="0" dirty="0" smtClean="0"/>
-              <a:t> specifies each drug classification that should be considered an opiate.</a:t>
-            </a:r>
-            <a:endParaRPr lang="en-US" dirty="0" smtClean="0"/>
-          </a:p>
-          <a:p>
-            <a:pPr marL="171450" indent="-171450">
+              <a:t> tests.</a:t>
+            </a:r>
+          </a:p>
+          <a:p>
+            <a:pPr marL="171450" marR="0" indent="-171450" algn="l" defTabSz="914400" rtl="0" eaLnBrk="1" fontAlgn="auto" latinLnBrk="0" hangingPunct="1">
+              <a:lnSpc>
+                <a:spcPct val="100000"/>
+              </a:lnSpc>
+              <a:spcBef>
+                <a:spcPts val="0"/>
+              </a:spcBef>
+              <a:spcAft>
+                <a:spcPts val="0"/>
+              </a:spcAft>
+              <a:buClrTx/>
+              <a:buSzTx/>
               <a:buFont typeface="Arial" charset="0"/>
               <a:buChar char="•"/>
+              <a:tabLst/>
+              <a:defRPr/>
+            </a:pPr>
+            <a:r>
+              <a:rPr lang="en-US" baseline="0" dirty="0" smtClean="0"/>
+              <a:t>&lt;Switch to Browser/</a:t>
+            </a:r>
+            <a:r>
+              <a:rPr lang="en-US" baseline="0" dirty="0" err="1" smtClean="0"/>
+              <a:t>Fitnesse</a:t>
+            </a:r>
+            <a:r>
+              <a:rPr lang="en-US" baseline="0" dirty="0" smtClean="0"/>
+              <a:t>, Switch to Code&gt;</a:t>
+            </a:r>
+          </a:p>
+          <a:p>
+            <a:pPr marL="171450" marR="0" indent="-171450" algn="l" defTabSz="914400" rtl="0" eaLnBrk="1" fontAlgn="auto" latinLnBrk="0" hangingPunct="1">
+              <a:lnSpc>
+                <a:spcPct val="100000"/>
+              </a:lnSpc>
+              <a:spcBef>
+                <a:spcPts val="0"/>
+              </a:spcBef>
+              <a:spcAft>
+                <a:spcPts val="0"/>
+              </a:spcAft>
+              <a:buClrTx/>
+              <a:buSzTx/>
+              <a:buFont typeface="Arial" charset="0"/>
+              <a:buChar char="•"/>
+              <a:tabLst/>
+              <a:defRPr/>
             </a:pPr>
             <a:r>
               <a:rPr lang="en-US" dirty="0" err="1" smtClean="0"/>
@@ -2283,7 +2600,11 @@
             </a:r>
             <a:r>
               <a:rPr lang="en-US" baseline="0" dirty="0" smtClean="0"/>
-              <a:t> states and tests the design of the classes used to determine if a drug is in this class.  </a:t>
+              <a:t> </a:t>
+            </a:r>
+            <a:r>
+              <a:rPr lang="en-US" baseline="0" dirty="0" smtClean="0"/>
+              <a:t>states and tests the design of the classes used to determine if a drug is in this class.  </a:t>
             </a:r>
             <a:r>
               <a:rPr lang="en-US" baseline="0" dirty="0" err="1" smtClean="0"/>
@@ -6321,7 +6642,7 @@
         <p:spPr>
           <a:xfrm>
             <a:off x="6096000" y="1690686"/>
-            <a:ext cx="4496972" cy="2677656"/>
+            <a:ext cx="4496972" cy="3785652"/>
           </a:xfrm>
           <a:prstGeom prst="rect">
             <a:avLst/>
@@ -6339,8 +6660,13 @@
             </a:pPr>
             <a:r>
               <a:rPr lang="en-US" sz="2400" dirty="0" smtClean="0"/>
-              <a:t>Foundational base of unit tests.</a:t>
-            </a:r>
+              <a:t>Foundational base of unit </a:t>
+            </a:r>
+            <a:r>
+              <a:rPr lang="en-US" sz="2400" dirty="0" smtClean="0"/>
+              <a:t>tests.</a:t>
+            </a:r>
+            <a:endParaRPr lang="en-US" sz="2400" dirty="0" smtClean="0"/>
           </a:p>
           <a:p>
             <a:pPr marL="285750" indent="-285750">
@@ -6367,7 +6693,29 @@
             </a:r>
             <a:r>
               <a:rPr lang="en-US" sz="2400" dirty="0" smtClean="0"/>
-              <a:t> testing services provided by the application independent of the UI.</a:t>
+              <a:t> testing services provided by the application independent of the UI</a:t>
+            </a:r>
+            <a:r>
+              <a:rPr lang="en-US" sz="2400" dirty="0" smtClean="0"/>
+              <a:t>.</a:t>
+            </a:r>
+          </a:p>
+          <a:p>
+            <a:pPr marL="285750" indent="-285750">
+              <a:buFont typeface="Arial" charset="0"/>
+              <a:buChar char="•"/>
+            </a:pPr>
+            <a:r>
+              <a:rPr lang="en-US" sz="2400" dirty="0" smtClean="0"/>
+              <a:t>Service refers to logical services </a:t>
+            </a:r>
+            <a:r>
+              <a:rPr lang="mr-IN" sz="2400" dirty="0" smtClean="0"/>
+              <a:t>–</a:t>
+            </a:r>
+            <a:r>
+              <a:rPr lang="en-US" sz="2400" dirty="0" smtClean="0"/>
+              <a:t> something the application does in response to inputs.</a:t>
             </a:r>
             <a:endParaRPr lang="en-US" sz="2400" dirty="0"/>
           </a:p>
@@ -6471,7 +6819,7 @@
         <p:spPr>
           <a:xfrm>
             <a:off x="708074" y="1690688"/>
-            <a:ext cx="4496972" cy="4524315"/>
+            <a:ext cx="4496972" cy="4893647"/>
           </a:xfrm>
           <a:prstGeom prst="rect">
             <a:avLst/>
@@ -6527,8 +6875,13 @@
             </a:pPr>
             <a:r>
               <a:rPr lang="en-US" sz="2400" dirty="0" smtClean="0"/>
-              <a:t>Unit tests are easy for developers to write, usually in same language as application.</a:t>
-            </a:r>
+              <a:t>Unit tests are easy for developers to write, usually in same language as </a:t>
+            </a:r>
+            <a:r>
+              <a:rPr lang="en-US" sz="2400" dirty="0" smtClean="0"/>
+              <a:t>application, locate bugs more precisely.</a:t>
+            </a:r>
+            <a:endParaRPr lang="en-US" sz="2400" dirty="0" smtClean="0"/>
           </a:p>
           <a:p>
             <a:pPr marL="285750" indent="-285750">
@@ -6603,15 +6956,258 @@
           <a:p>
             <a:r>
               <a:rPr lang="en-US" dirty="0" smtClean="0"/>
-              <a:t>The </a:t>
-            </a:r>
-            <a:r>
-              <a:rPr lang="en-US" dirty="0"/>
-              <a:t>T</a:t>
-            </a:r>
+              <a:t>Challenges</a:t>
+            </a:r>
+            <a:endParaRPr lang="en-US" dirty="0"/>
+          </a:p>
+        </p:txBody>
+      </p:sp>
+      <p:sp>
+        <p:nvSpPr>
+          <p:cNvPr id="3" name="Content Placeholder 2"/>
+          <p:cNvSpPr>
+            <a:spLocks noGrp="1"/>
+          </p:cNvSpPr>
+          <p:nvPr>
+            <p:ph idx="1"/>
+          </p:nvPr>
+        </p:nvSpPr>
+        <p:spPr>
+          <a:xfrm>
+            <a:off x="7113494" y="2161335"/>
+            <a:ext cx="3966883" cy="2356877"/>
+          </a:xfrm>
+        </p:spPr>
+        <p:txBody>
+          <a:bodyPr/>
+          <a:lstStyle/>
+          <a:p>
             <a:r>
               <a:rPr lang="en-US" dirty="0" smtClean="0"/>
-              <a:t>hree Layers of the Pyramid</a:t>
+              <a:t>Intentional Planning and Effort</a:t>
+            </a:r>
+          </a:p>
+          <a:p>
+            <a:r>
+              <a:rPr lang="en-US" dirty="0" smtClean="0"/>
+              <a:t>Shared Understanding</a:t>
+            </a:r>
+          </a:p>
+          <a:p>
+            <a:r>
+              <a:rPr lang="en-US" dirty="0" smtClean="0"/>
+              <a:t>Communication and Collaboration</a:t>
+            </a:r>
+            <a:endParaRPr lang="en-US" dirty="0"/>
+          </a:p>
+        </p:txBody>
+      </p:sp>
+      <p:pic>
+        <p:nvPicPr>
+          <p:cNvPr id="4" name="Picture 3"/>
+          <p:cNvPicPr>
+            <a:picLocks noChangeAspect="1"/>
+          </p:cNvPicPr>
+          <p:nvPr/>
+        </p:nvPicPr>
+        <p:blipFill>
+          <a:blip r:embed="rId3">
+            <a:extLst>
+              <a:ext uri="{28A0092B-C50C-407E-A947-70E740481C1C}">
+                <a14:useLocalDpi xmlns:a14="http://schemas.microsoft.com/office/drawing/2010/main" val="0"/>
+              </a:ext>
+            </a:extLst>
+          </a:blip>
+          <a:stretch>
+            <a:fillRect/>
+          </a:stretch>
+        </p:blipFill>
+        <p:spPr>
+          <a:xfrm>
+            <a:off x="838200" y="1690688"/>
+            <a:ext cx="6073588" cy="4036405"/>
+          </a:xfrm>
+          <a:prstGeom prst="rect">
+            <a:avLst/>
+          </a:prstGeom>
+        </p:spPr>
+      </p:pic>
+    </p:spTree>
+    <p:extLst>
+      <p:ext uri="{BB962C8B-B14F-4D97-AF65-F5344CB8AC3E}">
+        <p14:creationId xmlns:p14="http://schemas.microsoft.com/office/powerpoint/2010/main" val="623930801"/>
+      </p:ext>
+    </p:extLst>
+  </p:cSld>
+  <p:clrMapOvr>
+    <a:masterClrMapping/>
+  </p:clrMapOvr>
+  <p:timing>
+    <p:tnLst>
+      <p:par>
+        <p:cTn id="1" dur="indefinite" restart="never" nodeType="tmRoot"/>
+      </p:par>
+    </p:tnLst>
+  </p:timing>
+</p:sld>
+</file>
+
+<file path=ppt/slides/slide5.xml><?xml version="1.0" encoding="utf-8"?>
+<p:sld xmlns:a="http://schemas.openxmlformats.org/drawingml/2006/main" xmlns:r="http://schemas.openxmlformats.org/officeDocument/2006/relationships" xmlns:p="http://schemas.openxmlformats.org/presentationml/2006/main">
+  <p:cSld>
+    <p:spTree>
+      <p:nvGrpSpPr>
+        <p:cNvPr id="1" name=""/>
+        <p:cNvGrpSpPr/>
+        <p:nvPr/>
+      </p:nvGrpSpPr>
+      <p:grpSpPr>
+        <a:xfrm>
+          <a:off x="0" y="0"/>
+          <a:ext cx="0" cy="0"/>
+          <a:chOff x="0" y="0"/>
+          <a:chExt cx="0" cy="0"/>
+        </a:xfrm>
+      </p:grpSpPr>
+      <p:sp>
+        <p:nvSpPr>
+          <p:cNvPr id="2" name="Title 1"/>
+          <p:cNvSpPr>
+            <a:spLocks noGrp="1"/>
+          </p:cNvSpPr>
+          <p:nvPr>
+            <p:ph type="title"/>
+          </p:nvPr>
+        </p:nvSpPr>
+        <p:spPr/>
+        <p:txBody>
+          <a:bodyPr>
+            <a:normAutofit/>
+          </a:bodyPr>
+          <a:lstStyle/>
+          <a:p>
+            <a:r>
+              <a:rPr lang="en-US" sz="4000" dirty="0" smtClean="0"/>
+              <a:t>Sample Application</a:t>
+            </a:r>
+            <a:endParaRPr lang="en-US" sz="4000" dirty="0"/>
+          </a:p>
+        </p:txBody>
+      </p:sp>
+      <p:sp>
+        <p:nvSpPr>
+          <p:cNvPr id="3" name="Content Placeholder 2"/>
+          <p:cNvSpPr>
+            <a:spLocks noGrp="1"/>
+          </p:cNvSpPr>
+          <p:nvPr>
+            <p:ph idx="1"/>
+          </p:nvPr>
+        </p:nvSpPr>
+        <p:spPr>
+          <a:xfrm>
+            <a:off x="838200" y="1852519"/>
+            <a:ext cx="10515600" cy="567951"/>
+          </a:xfrm>
+        </p:spPr>
+        <p:txBody>
+          <a:bodyPr>
+            <a:normAutofit fontScale="77500" lnSpcReduction="20000"/>
+          </a:bodyPr>
+          <a:lstStyle/>
+          <a:p>
+            <a:r>
+              <a:rPr lang="en-US" dirty="0" smtClean="0"/>
+              <a:t>Rx Demo:  Web-based Prescribing Application, extracted from real clinical app in production for over a decade.</a:t>
+            </a:r>
+          </a:p>
+        </p:txBody>
+      </p:sp>
+      <p:pic>
+        <p:nvPicPr>
+          <p:cNvPr id="4" name="Picture 3"/>
+          <p:cNvPicPr>
+            <a:picLocks noChangeAspect="1"/>
+          </p:cNvPicPr>
+          <p:nvPr/>
+        </p:nvPicPr>
+        <p:blipFill>
+          <a:blip r:embed="rId3">
+            <a:extLst>
+              <a:ext uri="{28A0092B-C50C-407E-A947-70E740481C1C}">
+                <a14:useLocalDpi xmlns:a14="http://schemas.microsoft.com/office/drawing/2010/main" val="0"/>
+              </a:ext>
+            </a:extLst>
+          </a:blip>
+          <a:stretch>
+            <a:fillRect/>
+          </a:stretch>
+        </p:blipFill>
+        <p:spPr>
+          <a:xfrm>
+            <a:off x="315595" y="2582301"/>
+            <a:ext cx="11560810" cy="3200401"/>
+          </a:xfrm>
+          <a:prstGeom prst="rect">
+            <a:avLst/>
+          </a:prstGeom>
+        </p:spPr>
+      </p:pic>
+    </p:spTree>
+    <p:extLst>
+      <p:ext uri="{BB962C8B-B14F-4D97-AF65-F5344CB8AC3E}">
+        <p14:creationId xmlns:p14="http://schemas.microsoft.com/office/powerpoint/2010/main" val="567372212"/>
+      </p:ext>
+    </p:extLst>
+  </p:cSld>
+  <p:clrMapOvr>
+    <a:masterClrMapping/>
+  </p:clrMapOvr>
+  <p:timing>
+    <p:tnLst>
+      <p:par>
+        <p:cTn id="1" dur="indefinite" restart="never" nodeType="tmRoot"/>
+      </p:par>
+    </p:tnLst>
+  </p:timing>
+</p:sld>
+</file>
+
+<file path=ppt/slides/slide6.xml><?xml version="1.0" encoding="utf-8"?>
+<p:sld xmlns:a="http://schemas.openxmlformats.org/drawingml/2006/main" xmlns:r="http://schemas.openxmlformats.org/officeDocument/2006/relationships" xmlns:p="http://schemas.openxmlformats.org/presentationml/2006/main">
+  <p:cSld>
+    <p:spTree>
+      <p:nvGrpSpPr>
+        <p:cNvPr id="1" name=""/>
+        <p:cNvGrpSpPr/>
+        <p:nvPr/>
+      </p:nvGrpSpPr>
+      <p:grpSpPr>
+        <a:xfrm>
+          <a:off x="0" y="0"/>
+          <a:ext cx="0" cy="0"/>
+          <a:chOff x="0" y="0"/>
+          <a:chExt cx="0" cy="0"/>
+        </a:xfrm>
+      </p:grpSpPr>
+      <p:sp>
+        <p:nvSpPr>
+          <p:cNvPr id="2" name="Title 1"/>
+          <p:cNvSpPr>
+            <a:spLocks noGrp="1"/>
+          </p:cNvSpPr>
+          <p:nvPr>
+            <p:ph type="title"/>
+          </p:nvPr>
+        </p:nvSpPr>
+        <p:spPr/>
+        <p:txBody>
+          <a:bodyPr/>
+          <a:lstStyle/>
+          <a:p>
+            <a:r>
+              <a:rPr lang="en-US" dirty="0" smtClean="0"/>
+              <a:t>Sample App Pyramid</a:t>
             </a:r>
             <a:endParaRPr lang="en-US" dirty="0"/>
           </a:p>
@@ -6627,7 +7223,7 @@
             <p:ph idx="1"/>
             <p:extLst>
               <p:ext uri="{D42A27DB-BD31-4B8C-83A1-F6EECF244321}">
-                <p14:modId xmlns:p14="http://schemas.microsoft.com/office/powerpoint/2010/main" val="1231615142"/>
+                <p14:modId xmlns:p14="http://schemas.microsoft.com/office/powerpoint/2010/main" val="550358431"/>
               </p:ext>
             </p:extLst>
           </p:nvPr>
@@ -6742,7 +7338,11 @@
                     <a:p>
                       <a:r>
                         <a:rPr lang="en-US" dirty="0" smtClean="0"/>
-                        <a:t>Test Business Logic / Services</a:t>
+                        <a:t>Test Business Logic / </a:t>
+                      </a:r>
+                      <a:r>
+                        <a:rPr lang="en-US" dirty="0" smtClean="0"/>
+                        <a:t>Outputs to Inputs</a:t>
                       </a:r>
                       <a:endParaRPr lang="en-US" dirty="0"/>
                     </a:p>
@@ -6756,7 +7356,11 @@
                     <a:p>
                       <a:r>
                         <a:rPr lang="en-US" dirty="0" smtClean="0"/>
-                        <a:t>Test the User Interface</a:t>
+                        <a:t>Test the User </a:t>
+                      </a:r>
+                      <a:r>
+                        <a:rPr lang="en-US" dirty="0" smtClean="0"/>
+                        <a:t>Interface, Provides some End-End confirmation</a:t>
                       </a:r>
                       <a:endParaRPr lang="en-US" dirty="0"/>
                     </a:p>
@@ -6834,11 +7438,7 @@
                     <a:p>
                       <a:r>
                         <a:rPr lang="en-US" dirty="0" smtClean="0"/>
-                        <a:t>Speed</a:t>
-                      </a:r>
-                      <a:r>
-                        <a:rPr lang="en-US" baseline="0" dirty="0" smtClean="0"/>
-                        <a:t> / Cost</a:t>
+                        <a:t>Tool</a:t>
                       </a:r>
                       <a:endParaRPr lang="en-US" dirty="0"/>
                     </a:p>
@@ -6852,7 +7452,21 @@
                     <a:p>
                       <a:r>
                         <a:rPr lang="en-US" dirty="0" smtClean="0"/>
-                        <a:t>Fast / Low</a:t>
+                        <a:t>Junit, Jasmine</a:t>
+                      </a:r>
+                      <a:endParaRPr lang="en-US" dirty="0"/>
+                    </a:p>
+                  </a:txBody>
+                  <a:tcPr/>
+                </a:tc>
+                <a:tc>
+                  <a:txBody>
+                    <a:bodyPr/>
+                    <a:lstStyle/>
+                    <a:p>
+                      <a:r>
+                        <a:rPr lang="en-US" dirty="0" err="1" smtClean="0"/>
+                        <a:t>Fitnesse</a:t>
                       </a:r>
                       <a:endParaRPr lang="en-US" dirty="0"/>
                     </a:p>
@@ -6866,25 +7480,11 @@
                     <a:p>
                       <a:r>
                         <a:rPr lang="en-US" dirty="0" smtClean="0"/>
-                        <a:t>Fast to Medium /</a:t>
+                        <a:t>Selenium</a:t>
                       </a:r>
                       <a:r>
                         <a:rPr lang="en-US" baseline="0" dirty="0" smtClean="0"/>
-                        <a:t> Medium</a:t>
-                      </a:r>
-                      <a:endParaRPr lang="en-US" dirty="0"/>
-                    </a:p>
-                  </a:txBody>
-                  <a:tcPr/>
-                </a:tc>
-                <a:tc>
-                  <a:txBody>
-                    <a:bodyPr/>
-                    <a:lstStyle/>
-                    <a:p>
-                      <a:r>
-                        <a:rPr lang="en-US" dirty="0" smtClean="0"/>
-                        <a:t>Slow / High</a:t>
+                        <a:t> via Junit</a:t>
                       </a:r>
                       <a:endParaRPr lang="en-US" dirty="0"/>
                     </a:p>
@@ -6900,257 +7500,6 @@
     <p:extLst>
       <p:ext uri="{BB962C8B-B14F-4D97-AF65-F5344CB8AC3E}">
         <p14:creationId xmlns:p14="http://schemas.microsoft.com/office/powerpoint/2010/main" val="2014155585"/>
-      </p:ext>
-    </p:extLst>
-  </p:cSld>
-  <p:clrMapOvr>
-    <a:masterClrMapping/>
-  </p:clrMapOvr>
-  <p:timing>
-    <p:tnLst>
-      <p:par>
-        <p:cTn id="1" dur="indefinite" restart="never" nodeType="tmRoot"/>
-      </p:par>
-    </p:tnLst>
-  </p:timing>
-</p:sld>
-</file>
-
-<file path=ppt/slides/slide5.xml><?xml version="1.0" encoding="utf-8"?>
-<p:sld xmlns:a="http://schemas.openxmlformats.org/drawingml/2006/main" xmlns:r="http://schemas.openxmlformats.org/officeDocument/2006/relationships" xmlns:p="http://schemas.openxmlformats.org/presentationml/2006/main">
-  <p:cSld>
-    <p:spTree>
-      <p:nvGrpSpPr>
-        <p:cNvPr id="1" name=""/>
-        <p:cNvGrpSpPr/>
-        <p:nvPr/>
-      </p:nvGrpSpPr>
-      <p:grpSpPr>
-        <a:xfrm>
-          <a:off x="0" y="0"/>
-          <a:ext cx="0" cy="0"/>
-          <a:chOff x="0" y="0"/>
-          <a:chExt cx="0" cy="0"/>
-        </a:xfrm>
-      </p:grpSpPr>
-      <p:sp>
-        <p:nvSpPr>
-          <p:cNvPr id="2" name="Title 1"/>
-          <p:cNvSpPr>
-            <a:spLocks noGrp="1"/>
-          </p:cNvSpPr>
-          <p:nvPr>
-            <p:ph type="title"/>
-          </p:nvPr>
-        </p:nvSpPr>
-        <p:spPr/>
-        <p:txBody>
-          <a:bodyPr/>
-          <a:lstStyle/>
-          <a:p>
-            <a:r>
-              <a:rPr lang="en-US" dirty="0" smtClean="0"/>
-              <a:t>Challenges</a:t>
-            </a:r>
-            <a:endParaRPr lang="en-US" dirty="0"/>
-          </a:p>
-        </p:txBody>
-      </p:sp>
-      <p:sp>
-        <p:nvSpPr>
-          <p:cNvPr id="3" name="Content Placeholder 2"/>
-          <p:cNvSpPr>
-            <a:spLocks noGrp="1"/>
-          </p:cNvSpPr>
-          <p:nvPr>
-            <p:ph idx="1"/>
-          </p:nvPr>
-        </p:nvSpPr>
-        <p:spPr>
-          <a:xfrm>
-            <a:off x="7113494" y="2161335"/>
-            <a:ext cx="3966883" cy="2356877"/>
-          </a:xfrm>
-        </p:spPr>
-        <p:txBody>
-          <a:bodyPr/>
-          <a:lstStyle/>
-          <a:p>
-            <a:r>
-              <a:rPr lang="en-US" dirty="0" smtClean="0"/>
-              <a:t>Intentional Planning and Effort</a:t>
-            </a:r>
-          </a:p>
-          <a:p>
-            <a:r>
-              <a:rPr lang="en-US" dirty="0" smtClean="0"/>
-              <a:t>Shared Understanding</a:t>
-            </a:r>
-          </a:p>
-          <a:p>
-            <a:r>
-              <a:rPr lang="en-US" dirty="0" smtClean="0"/>
-              <a:t>Communication and Collaboration</a:t>
-            </a:r>
-            <a:endParaRPr lang="en-US" dirty="0"/>
-          </a:p>
-        </p:txBody>
-      </p:sp>
-      <p:pic>
-        <p:nvPicPr>
-          <p:cNvPr id="4" name="Picture 3"/>
-          <p:cNvPicPr>
-            <a:picLocks noChangeAspect="1"/>
-          </p:cNvPicPr>
-          <p:nvPr/>
-        </p:nvPicPr>
-        <p:blipFill>
-          <a:blip r:embed="rId3">
-            <a:extLst>
-              <a:ext uri="{28A0092B-C50C-407E-A947-70E740481C1C}">
-                <a14:useLocalDpi xmlns:a14="http://schemas.microsoft.com/office/drawing/2010/main" val="0"/>
-              </a:ext>
-            </a:extLst>
-          </a:blip>
-          <a:stretch>
-            <a:fillRect/>
-          </a:stretch>
-        </p:blipFill>
-        <p:spPr>
-          <a:xfrm>
-            <a:off x="838200" y="1690688"/>
-            <a:ext cx="6073588" cy="4036405"/>
-          </a:xfrm>
-          <a:prstGeom prst="rect">
-            <a:avLst/>
-          </a:prstGeom>
-        </p:spPr>
-      </p:pic>
-    </p:spTree>
-    <p:extLst>
-      <p:ext uri="{BB962C8B-B14F-4D97-AF65-F5344CB8AC3E}">
-        <p14:creationId xmlns:p14="http://schemas.microsoft.com/office/powerpoint/2010/main" val="623930801"/>
-      </p:ext>
-    </p:extLst>
-  </p:cSld>
-  <p:clrMapOvr>
-    <a:masterClrMapping/>
-  </p:clrMapOvr>
-  <p:timing>
-    <p:tnLst>
-      <p:par>
-        <p:cTn id="1" dur="indefinite" restart="never" nodeType="tmRoot"/>
-      </p:par>
-    </p:tnLst>
-  </p:timing>
-</p:sld>
-</file>
-
-<file path=ppt/slides/slide6.xml><?xml version="1.0" encoding="utf-8"?>
-<p:sld xmlns:a="http://schemas.openxmlformats.org/drawingml/2006/main" xmlns:r="http://schemas.openxmlformats.org/officeDocument/2006/relationships" xmlns:p="http://schemas.openxmlformats.org/presentationml/2006/main">
-  <p:cSld>
-    <p:spTree>
-      <p:nvGrpSpPr>
-        <p:cNvPr id="1" name=""/>
-        <p:cNvGrpSpPr/>
-        <p:nvPr/>
-      </p:nvGrpSpPr>
-      <p:grpSpPr>
-        <a:xfrm>
-          <a:off x="0" y="0"/>
-          <a:ext cx="0" cy="0"/>
-          <a:chOff x="0" y="0"/>
-          <a:chExt cx="0" cy="0"/>
-        </a:xfrm>
-      </p:grpSpPr>
-      <p:sp>
-        <p:nvSpPr>
-          <p:cNvPr id="2" name="Title 1"/>
-          <p:cNvSpPr>
-            <a:spLocks noGrp="1"/>
-          </p:cNvSpPr>
-          <p:nvPr>
-            <p:ph type="title"/>
-          </p:nvPr>
-        </p:nvSpPr>
-        <p:spPr/>
-        <p:txBody>
-          <a:bodyPr>
-            <a:normAutofit/>
-          </a:bodyPr>
-          <a:lstStyle/>
-          <a:p>
-            <a:r>
-              <a:rPr lang="en-US" sz="4000" dirty="0" smtClean="0"/>
-              <a:t>Sample Application</a:t>
-            </a:r>
-            <a:endParaRPr lang="en-US" sz="4000" dirty="0"/>
-          </a:p>
-        </p:txBody>
-      </p:sp>
-      <p:sp>
-        <p:nvSpPr>
-          <p:cNvPr id="3" name="Content Placeholder 2"/>
-          <p:cNvSpPr>
-            <a:spLocks noGrp="1"/>
-          </p:cNvSpPr>
-          <p:nvPr>
-            <p:ph idx="1"/>
-          </p:nvPr>
-        </p:nvSpPr>
-        <p:spPr>
-          <a:xfrm>
-            <a:off x="838200" y="1852519"/>
-            <a:ext cx="10515600" cy="567951"/>
-          </a:xfrm>
-        </p:spPr>
-        <p:txBody>
-          <a:bodyPr>
-            <a:normAutofit fontScale="77500" lnSpcReduction="20000"/>
-          </a:bodyPr>
-          <a:lstStyle/>
-          <a:p>
-            <a:r>
-              <a:rPr lang="en-US" dirty="0" smtClean="0"/>
-              <a:t>Rx Demo:  Web-based Prescribing Application, extracted from real clinical app in production for over a decade.</a:t>
-            </a:r>
-          </a:p>
-        </p:txBody>
-      </p:sp>
-      <p:pic>
-        <p:nvPicPr>
-          <p:cNvPr id="4" name="Picture 3"/>
-          <p:cNvPicPr>
-            <a:picLocks noChangeAspect="1"/>
-          </p:cNvPicPr>
-          <p:nvPr/>
-        </p:nvPicPr>
-        <p:blipFill>
-          <a:blip r:embed="rId3">
-            <a:extLst>
-              <a:ext uri="{28A0092B-C50C-407E-A947-70E740481C1C}">
-                <a14:useLocalDpi xmlns:a14="http://schemas.microsoft.com/office/drawing/2010/main" val="0"/>
-              </a:ext>
-            </a:extLst>
-          </a:blip>
-          <a:stretch>
-            <a:fillRect/>
-          </a:stretch>
-        </p:blipFill>
-        <p:spPr>
-          <a:xfrm>
-            <a:off x="315595" y="2582301"/>
-            <a:ext cx="11560810" cy="3200401"/>
-          </a:xfrm>
-          <a:prstGeom prst="rect">
-            <a:avLst/>
-          </a:prstGeom>
-        </p:spPr>
-      </p:pic>
-    </p:spTree>
-    <p:extLst>
-      <p:ext uri="{BB962C8B-B14F-4D97-AF65-F5344CB8AC3E}">
-        <p14:creationId xmlns:p14="http://schemas.microsoft.com/office/powerpoint/2010/main" val="567372212"/>
       </p:ext>
     </p:extLst>
   </p:cSld>

</xml_diff>

<commit_message>
test changes and presentation changes
</commit_message>
<xml_diff>
--- a/Test Pyramid Presentation.pptx
+++ b/Test Pyramid Presentation.pptx
@@ -211,7 +211,7 @@
           <a:p>
             <a:fld id="{51E71193-F4DE-7347-96CF-6A9725F5B501}" type="datetimeFigureOut">
               <a:rPr lang="en-US" smtClean="0"/>
-              <a:t>8/1/17</a:t>
+              <a:t>8/4/17</a:t>
             </a:fld>
             <a:endParaRPr lang="en-US"/>
           </a:p>
@@ -1221,7 +1221,78 @@
             </a:r>
             <a:r>
               <a:rPr lang="en-US" baseline="0" dirty="0" smtClean="0"/>
-              <a:t> failure of the Selenium tests could be less precise.</a:t>
+              <a:t> failure of the Selenium tests could be less precise</a:t>
+            </a:r>
+            <a:r>
+              <a:rPr lang="en-US" baseline="0" dirty="0" smtClean="0"/>
+              <a:t>.</a:t>
+            </a:r>
+          </a:p>
+          <a:p>
+            <a:pPr marL="171450" marR="0" indent="-171450" algn="l" defTabSz="914400" rtl="0" eaLnBrk="1" fontAlgn="auto" latinLnBrk="0" hangingPunct="1">
+              <a:lnSpc>
+                <a:spcPct val="100000"/>
+              </a:lnSpc>
+              <a:spcBef>
+                <a:spcPts val="0"/>
+              </a:spcBef>
+              <a:spcAft>
+                <a:spcPts val="0"/>
+              </a:spcAft>
+              <a:buClrTx/>
+              <a:buSzTx/>
+              <a:buFont typeface="Arial" charset="0"/>
+              <a:buChar char="•"/>
+              <a:tabLst/>
+              <a:defRPr/>
+            </a:pPr>
+            <a:endParaRPr lang="en-US" baseline="0" dirty="0" smtClean="0"/>
+          </a:p>
+          <a:p>
+            <a:pPr marL="171450" marR="0" indent="-171450" algn="l" defTabSz="914400" rtl="0" eaLnBrk="1" fontAlgn="auto" latinLnBrk="0" hangingPunct="1">
+              <a:lnSpc>
+                <a:spcPct val="100000"/>
+              </a:lnSpc>
+              <a:spcBef>
+                <a:spcPts val="0"/>
+              </a:spcBef>
+              <a:spcAft>
+                <a:spcPts val="0"/>
+              </a:spcAft>
+              <a:buClrTx/>
+              <a:buSzTx/>
+              <a:buFont typeface="Arial" charset="0"/>
+              <a:buChar char="•"/>
+              <a:tabLst/>
+              <a:defRPr/>
+            </a:pPr>
+            <a:r>
+              <a:rPr lang="en-US" baseline="0" dirty="0" smtClean="0"/>
+              <a:t>What if we were testing entirely through the UI?  All of these scenarios covered in </a:t>
+            </a:r>
+            <a:r>
+              <a:rPr lang="en-US" baseline="0" dirty="0" err="1" smtClean="0"/>
+              <a:t>fitnesse</a:t>
+            </a:r>
+            <a:r>
+              <a:rPr lang="en-US" baseline="0" dirty="0" smtClean="0"/>
+              <a:t> and unit tests would need to be managed through UI tests </a:t>
+            </a:r>
+            <a:r>
+              <a:rPr lang="mr-IN" baseline="0" dirty="0" smtClean="0"/>
+              <a:t>–</a:t>
+            </a:r>
+            <a:r>
+              <a:rPr lang="en-US" baseline="0" dirty="0" smtClean="0"/>
+              <a:t> all the duration calculation scenarios, every opiate drug identified correctly, how to verify drugs aren’t included accidentally as opiates </a:t>
+            </a:r>
+            <a:r>
+              <a:rPr lang="mr-IN" baseline="0" dirty="0" smtClean="0"/>
+              <a:t>–</a:t>
+            </a:r>
+            <a:r>
+              <a:rPr lang="en-US" baseline="0" dirty="0" smtClean="0"/>
+              <a:t> prescribe every single possible drug?</a:t>
             </a:r>
             <a:endParaRPr lang="en-US" baseline="0" dirty="0" smtClean="0"/>
           </a:p>
@@ -1493,11 +1564,7 @@
             </a:r>
             <a:r>
               <a:rPr lang="en-US" baseline="0" dirty="0" smtClean="0"/>
-              <a:t> distribution by purpose and </a:t>
-            </a:r>
-            <a:r>
-              <a:rPr lang="en-US" baseline="0" dirty="0" smtClean="0"/>
-              <a:t>type </a:t>
+              <a:t> distribution by purpose and type </a:t>
             </a:r>
             <a:r>
               <a:rPr lang="mr-IN" baseline="0" dirty="0" smtClean="0"/>
@@ -1507,7 +1574,6 @@
               <a:rPr lang="en-US" baseline="0" dirty="0" smtClean="0"/>
               <a:t> Succeeding with Agile, 2009</a:t>
             </a:r>
-            <a:endParaRPr lang="en-US" baseline="0" dirty="0" smtClean="0"/>
           </a:p>
           <a:p>
             <a:pPr marL="171450" indent="-171450">
@@ -1516,11 +1582,7 @@
             </a:pPr>
             <a:r>
               <a:rPr lang="en-US" baseline="0" dirty="0" smtClean="0"/>
-              <a:t>Describe levels</a:t>
-            </a:r>
-            <a:r>
-              <a:rPr lang="en-US" baseline="0" dirty="0" smtClean="0"/>
-              <a:t>.</a:t>
+              <a:t>Describe levels.</a:t>
             </a:r>
           </a:p>
           <a:p>
@@ -1540,7 +1602,6 @@
               <a:rPr lang="en-US" baseline="0" dirty="0" smtClean="0"/>
               <a:t> Forgotten Layer of the Test Automation Pyramid regarding service layer</a:t>
             </a:r>
-            <a:endParaRPr lang="en-US" baseline="0" dirty="0" smtClean="0"/>
           </a:p>
           <a:p>
             <a:pPr marL="171450" indent="-171450">
@@ -1553,11 +1614,7 @@
             </a:r>
             <a:r>
               <a:rPr lang="en-US" baseline="0" dirty="0" smtClean="0"/>
-              <a:t> </a:t>
-            </a:r>
-            <a:r>
-              <a:rPr lang="en-US" baseline="0" dirty="0" smtClean="0"/>
-              <a:t>has similar concept for testing </a:t>
+              <a:t> has similar concept for testing </a:t>
             </a:r>
             <a:r>
               <a:rPr lang="mr-IN" baseline="0" dirty="0" smtClean="0"/>
@@ -1565,11 +1622,7 @@
             </a:r>
             <a:r>
               <a:rPr lang="en-US" baseline="0" dirty="0" smtClean="0"/>
-              <a:t> Small, Medium, Large (Unit, Integration, System</a:t>
-            </a:r>
-            <a:r>
-              <a:rPr lang="en-US" baseline="0" dirty="0" smtClean="0"/>
-              <a:t>).</a:t>
+              <a:t> Small, Medium, Large (Unit, Integration, System).</a:t>
             </a:r>
           </a:p>
           <a:p>
@@ -1854,11 +1907,7 @@
             </a:r>
             <a:r>
               <a:rPr lang="en-US" baseline="0" dirty="0" smtClean="0"/>
-              <a:t> avoid gaps and </a:t>
-            </a:r>
-            <a:r>
-              <a:rPr lang="en-US" baseline="0" dirty="0" smtClean="0"/>
-              <a:t>duplication</a:t>
+              <a:t> avoid gaps and duplication</a:t>
             </a:r>
           </a:p>
           <a:p>
@@ -2123,11 +2172,7 @@
           <a:p>
             <a:r>
               <a:rPr lang="en-US" baseline="0" dirty="0" smtClean="0"/>
-              <a:t>- </a:t>
-            </a:r>
-            <a:r>
-              <a:rPr lang="en-US" baseline="0" dirty="0" smtClean="0"/>
-              <a:t>Discussing and creating a grid of your test strategy in and of itself is useful.</a:t>
+              <a:t>- Discussing and creating a grid of your test strategy in and of itself is useful.</a:t>
             </a:r>
           </a:p>
         </p:txBody>
@@ -2218,11 +2263,7 @@
             </a:pPr>
             <a:r>
               <a:rPr lang="en-US" dirty="0" smtClean="0"/>
-              <a:t>To </a:t>
-            </a:r>
-            <a:r>
-              <a:rPr lang="en-US" dirty="0" smtClean="0"/>
-              <a:t>illustrate </a:t>
+              <a:t>To illustrate </a:t>
             </a:r>
             <a:r>
               <a:rPr lang="en-US" dirty="0" err="1" smtClean="0"/>
@@ -2234,11 +2275,7 @@
             </a:r>
             <a:r>
               <a:rPr lang="en-US" baseline="0" dirty="0" smtClean="0"/>
-              <a:t> layer of tests, we’ll look at tests for a particular </a:t>
-            </a:r>
-            <a:r>
-              <a:rPr lang="en-US" baseline="0" dirty="0" smtClean="0"/>
-              <a:t>feature</a:t>
+              <a:t> layer of tests, we’ll look at tests for a particular feature</a:t>
             </a:r>
           </a:p>
           <a:p>
@@ -6190,11 +6227,7 @@
                       </a:r>
                       <a:r>
                         <a:rPr lang="en-US" baseline="0" dirty="0" smtClean="0"/>
-                        <a:t> / </a:t>
-                      </a:r>
-                      <a:r>
-                        <a:rPr lang="en-US" baseline="0" dirty="0" smtClean="0"/>
-                        <a:t>Junit)</a:t>
+                        <a:t> / Junit)</a:t>
                       </a:r>
                       <a:endParaRPr lang="en-US" dirty="0"/>
                     </a:p>
@@ -6567,7 +6600,6 @@
               <a:rPr lang="en-US" dirty="0" smtClean="0"/>
               <a:t>tests.</a:t>
             </a:r>
-            <a:endParaRPr lang="en-US" dirty="0" smtClean="0"/>
           </a:p>
           <a:p>
             <a:r>
@@ -7043,11 +7075,7 @@
             </a:r>
             <a:r>
               <a:rPr lang="en-US" dirty="0" smtClean="0"/>
-              <a:t>: Mike Bland, 2011</a:t>
-            </a:r>
-            <a:r>
-              <a:rPr lang="en-US" dirty="0" smtClean="0"/>
-              <a:t>.</a:t>
+              <a:t>: Mike Bland, 2011.</a:t>
             </a:r>
           </a:p>
           <a:p>
@@ -7061,7 +7089,6 @@
               <a:rPr lang="en-US" dirty="0" smtClean="0"/>
               <a:t>:  Alistair Cockburn, 1999.</a:t>
             </a:r>
-            <a:endParaRPr lang="en-US" dirty="0" smtClean="0"/>
           </a:p>
           <a:p>
             <a:endParaRPr lang="en-US" dirty="0" smtClean="0"/>
@@ -7187,13 +7214,8 @@
             </a:pPr>
             <a:r>
               <a:rPr lang="en-US" sz="2800" dirty="0" smtClean="0"/>
-              <a:t>Foundational base of unit </a:t>
-            </a:r>
-            <a:r>
-              <a:rPr lang="en-US" sz="2800" dirty="0" smtClean="0"/>
-              <a:t>tests</a:t>
-            </a:r>
-            <a:endParaRPr lang="en-US" sz="2800" dirty="0" smtClean="0"/>
+              <a:t>Foundational base of unit tests</a:t>
+            </a:r>
           </a:p>
           <a:p>
             <a:pPr marL="285750" indent="-285750">
@@ -7205,13 +7227,8 @@
             </a:pPr>
             <a:r>
               <a:rPr lang="en-US" sz="2800" dirty="0" smtClean="0"/>
-              <a:t>Minimum necessary tests through user </a:t>
-            </a:r>
-            <a:r>
-              <a:rPr lang="en-US" sz="2800" dirty="0" smtClean="0"/>
-              <a:t>interface</a:t>
-            </a:r>
-            <a:endParaRPr lang="en-US" sz="2800" dirty="0" smtClean="0"/>
+              <a:t>Minimum necessary tests through user interface</a:t>
+            </a:r>
           </a:p>
           <a:p>
             <a:pPr marL="285750" indent="-285750">
@@ -7237,15 +7254,7 @@
             </a:pPr>
             <a:r>
               <a:rPr lang="en-US" sz="2800" dirty="0" smtClean="0"/>
-              <a:t>Service </a:t>
-            </a:r>
-            <a:r>
-              <a:rPr lang="en-US" sz="2800" dirty="0" smtClean="0"/>
-              <a:t>refers to logical </a:t>
-            </a:r>
-            <a:r>
-              <a:rPr lang="en-US" sz="2800" dirty="0" smtClean="0"/>
-              <a:t>services </a:t>
+              <a:t>Service refers to logical services </a:t>
             </a:r>
             <a:r>
               <a:rPr lang="mr-IN" sz="2800" dirty="0" smtClean="0"/>
@@ -7623,7 +7632,6 @@
               <a:rPr lang="en-US" sz="2800" dirty="0" smtClean="0"/>
               <a:t>expensive, less precise</a:t>
             </a:r>
-            <a:endParaRPr lang="en-US" sz="2800" dirty="0" smtClean="0"/>
           </a:p>
           <a:p>
             <a:pPr marL="285750" indent="-285750">
@@ -7635,13 +7643,8 @@
             </a:pPr>
             <a:r>
               <a:rPr lang="en-US" sz="2800" dirty="0" smtClean="0"/>
-              <a:t>Unit tests are easy for developers to write, usually in same language as application, locate bugs more </a:t>
-            </a:r>
-            <a:r>
-              <a:rPr lang="en-US" sz="2800" dirty="0" smtClean="0"/>
-              <a:t>precisely</a:t>
-            </a:r>
-            <a:endParaRPr lang="en-US" sz="2800" dirty="0" smtClean="0"/>
+              <a:t>Unit tests are easy for developers to write, usually in same language as application, locate bugs more precisely</a:t>
+            </a:r>
           </a:p>
           <a:p>
             <a:pPr marL="285750" indent="-285750">
@@ -7655,7 +7658,6 @@
               <a:rPr lang="en-US" sz="2800" dirty="0" smtClean="0"/>
               <a:t>Service level tests can test logic independent of UI</a:t>
             </a:r>
-            <a:endParaRPr lang="en-US" sz="2800" dirty="0" smtClean="0"/>
           </a:p>
         </p:txBody>
       </p:sp>
@@ -8376,15 +8378,7 @@
                       </a:r>
                       <a:r>
                         <a:rPr lang="en-US" baseline="0" dirty="0" smtClean="0"/>
-                        <a:t> </a:t>
-                      </a:r>
-                      <a:r>
-                        <a:rPr lang="en-US" baseline="0" dirty="0" smtClean="0"/>
-                        <a:t>(including QA) and </a:t>
-                      </a:r>
-                      <a:r>
-                        <a:rPr lang="en-US" baseline="0" dirty="0" smtClean="0"/>
-                        <a:t>Developers</a:t>
+                        <a:t> (including QA) and Developers</a:t>
                       </a:r>
                       <a:endParaRPr lang="en-US" dirty="0"/>
                     </a:p>
@@ -8398,11 +8392,7 @@
                     <a:p>
                       <a:r>
                         <a:rPr lang="en-US" dirty="0" smtClean="0"/>
-                        <a:t>QA </a:t>
-                      </a:r>
-                      <a:r>
-                        <a:rPr lang="en-US" dirty="0" smtClean="0"/>
-                        <a:t>automation</a:t>
+                        <a:t>QA automation</a:t>
                       </a:r>
                       <a:endParaRPr lang="en-US" dirty="0"/>
                     </a:p>

</xml_diff>

<commit_message>
Adding tests for invalid component, slide updates
</commit_message>
<xml_diff>
--- a/Test Pyramid Presentation.pptx
+++ b/Test Pyramid Presentation.pptx
@@ -1221,11 +1221,7 @@
             </a:r>
             <a:r>
               <a:rPr lang="en-US" baseline="0" dirty="0" smtClean="0"/>
-              <a:t> failure of the Selenium tests could be less precise</a:t>
-            </a:r>
-            <a:r>
-              <a:rPr lang="en-US" baseline="0" dirty="0" smtClean="0"/>
-              <a:t>.</a:t>
+              <a:t> failure of the Selenium tests could be less precise.</a:t>
             </a:r>
           </a:p>
           <a:p>
@@ -1294,7 +1290,6 @@
               <a:rPr lang="en-US" baseline="0" dirty="0" smtClean="0"/>
               <a:t> prescribe every single possible drug?</a:t>
             </a:r>
-            <a:endParaRPr lang="en-US" baseline="0" dirty="0" smtClean="0"/>
           </a:p>
         </p:txBody>
       </p:sp>
@@ -7953,11 +7948,13 @@
         <p:spPr>
           <a:xfrm>
             <a:off x="7113494" y="2161335"/>
-            <a:ext cx="3966883" cy="2356877"/>
+            <a:ext cx="4848657" cy="2500606"/>
           </a:xfrm>
         </p:spPr>
         <p:txBody>
-          <a:bodyPr/>
+          <a:bodyPr>
+            <a:normAutofit/>
+          </a:bodyPr>
           <a:lstStyle/>
           <a:p>
             <a:r>
@@ -7974,7 +7971,11 @@
           <a:p>
             <a:r>
               <a:rPr lang="en-US" dirty="0" smtClean="0"/>
-              <a:t>Communication and Collaboration</a:t>
+              <a:t>Frequent Communication </a:t>
+            </a:r>
+            <a:r>
+              <a:rPr lang="en-US" dirty="0" smtClean="0"/>
+              <a:t>and Collaboration</a:t>
             </a:r>
             <a:endParaRPr lang="en-US" dirty="0"/>
           </a:p>
@@ -8066,7 +8067,15 @@
           <a:p>
             <a:r>
               <a:rPr lang="en-US" sz="4000" dirty="0" smtClean="0"/>
-              <a:t>Sample Application</a:t>
+              <a:t>Sample </a:t>
+            </a:r>
+            <a:r>
+              <a:rPr lang="en-US" sz="4000" dirty="0" smtClean="0"/>
+              <a:t>Application : </a:t>
+            </a:r>
+            <a:r>
+              <a:rPr lang="en-US" sz="4000" dirty="0" err="1" smtClean="0"/>
+              <a:t>RxDemo</a:t>
             </a:r>
             <a:endParaRPr lang="en-US" sz="4000" dirty="0"/>
           </a:p>
@@ -8184,8 +8193,12 @@
           <a:lstStyle/>
           <a:p>
             <a:r>
+              <a:rPr lang="en-US" dirty="0" err="1" smtClean="0"/>
+              <a:t>RxDemo</a:t>
+            </a:r>
+            <a:r>
               <a:rPr lang="en-US" dirty="0" smtClean="0"/>
-              <a:t>Sample App Pyramid</a:t>
+              <a:t> Automated Test Strategy</a:t>
             </a:r>
             <a:endParaRPr lang="en-US" dirty="0"/>
           </a:p>
@@ -8201,14 +8214,14 @@
             <p:ph idx="1"/>
             <p:extLst>
               <p:ext uri="{D42A27DB-BD31-4B8C-83A1-F6EECF244321}">
-                <p14:modId xmlns:p14="http://schemas.microsoft.com/office/powerpoint/2010/main" val="890689188"/>
+                <p14:modId xmlns:p14="http://schemas.microsoft.com/office/powerpoint/2010/main" val="1037713816"/>
               </p:ext>
             </p:extLst>
           </p:nvPr>
         </p:nvGraphicFramePr>
         <p:xfrm>
           <a:off x="838200" y="1825625"/>
-          <a:ext cx="10359684" cy="3280155"/>
+          <a:ext cx="10359684" cy="3405970"/>
         </p:xfrm>
         <a:graphic>
           <a:graphicData uri="http://schemas.openxmlformats.org/drawingml/2006/table">
@@ -8241,14 +8254,164 @@
                     <a:p>
                       <a:pPr algn="ctr"/>
                       <a:r>
+                        <a:rPr lang="en-US" sz="2400" dirty="0" smtClean="0"/>
+                        <a:t>Purpose</a:t>
+                      </a:r>
+                      <a:endParaRPr lang="en-US" sz="2400" dirty="0"/>
+                    </a:p>
+                  </a:txBody>
+                  <a:tcPr/>
+                </a:tc>
+                <a:tc>
+                  <a:txBody>
+                    <a:bodyPr/>
+                    <a:lstStyle/>
+                    <a:p>
+                      <a:pPr algn="ctr"/>
+                      <a:r>
+                        <a:rPr lang="en-US" sz="2400" dirty="0" smtClean="0"/>
+                        <a:t>Authors</a:t>
+                      </a:r>
+                      <a:endParaRPr lang="en-US" sz="2400" dirty="0"/>
+                    </a:p>
+                  </a:txBody>
+                  <a:tcPr/>
+                </a:tc>
+                <a:tc>
+                  <a:txBody>
+                    <a:bodyPr/>
+                    <a:lstStyle/>
+                    <a:p>
+                      <a:pPr algn="ctr"/>
+                      <a:r>
+                        <a:rPr lang="en-US" sz="2400" dirty="0" smtClean="0"/>
+                        <a:t>Tools</a:t>
+                      </a:r>
+                      <a:endParaRPr lang="en-US" sz="2400" dirty="0"/>
+                    </a:p>
+                  </a:txBody>
+                  <a:tcPr/>
+                </a:tc>
+              </a:tr>
+              <a:tr h="788585">
+                <a:tc>
+                  <a:txBody>
+                    <a:bodyPr/>
+                    <a:lstStyle/>
+                    <a:p>
+                      <a:pPr algn="ctr"/>
+                      <a:r>
                         <a:rPr lang="en-US" sz="2800" dirty="0" smtClean="0"/>
-                        <a:t>Unit</a:t>
+                        <a:t>UI</a:t>
                       </a:r>
                       <a:endParaRPr lang="en-US" sz="2800" dirty="0"/>
                     </a:p>
                   </a:txBody>
                   <a:tcPr/>
                 </a:tc>
+                <a:tc>
+                  <a:txBody>
+                    <a:bodyPr/>
+                    <a:lstStyle/>
+                    <a:p>
+                      <a:pPr marL="0" marR="0" indent="0" algn="l" defTabSz="914400" rtl="0" eaLnBrk="1" fontAlgn="auto" latinLnBrk="0" hangingPunct="1">
+                        <a:lnSpc>
+                          <a:spcPct val="100000"/>
+                        </a:lnSpc>
+                        <a:spcBef>
+                          <a:spcPts val="0"/>
+                        </a:spcBef>
+                        <a:spcAft>
+                          <a:spcPts val="0"/>
+                        </a:spcAft>
+                        <a:buClrTx/>
+                        <a:buSzTx/>
+                        <a:buFontTx/>
+                        <a:buNone/>
+                        <a:tabLst/>
+                        <a:defRPr/>
+                      </a:pPr>
+                      <a:r>
+                        <a:rPr lang="en-US" dirty="0" smtClean="0"/>
+                        <a:t>Test UI functionality, Provides some End-End confirmation</a:t>
+                      </a:r>
+                    </a:p>
+                  </a:txBody>
+                  <a:tcPr/>
+                </a:tc>
+                <a:tc>
+                  <a:txBody>
+                    <a:bodyPr/>
+                    <a:lstStyle/>
+                    <a:p>
+                      <a:pPr marL="0" marR="0" indent="0" algn="l" defTabSz="914400" rtl="0" eaLnBrk="1" fontAlgn="auto" latinLnBrk="0" hangingPunct="1">
+                        <a:lnSpc>
+                          <a:spcPct val="100000"/>
+                        </a:lnSpc>
+                        <a:spcBef>
+                          <a:spcPts val="0"/>
+                        </a:spcBef>
+                        <a:spcAft>
+                          <a:spcPts val="0"/>
+                        </a:spcAft>
+                        <a:buClrTx/>
+                        <a:buSzTx/>
+                        <a:buFontTx/>
+                        <a:buNone/>
+                        <a:tabLst/>
+                        <a:defRPr/>
+                      </a:pPr>
+                      <a:r>
+                        <a:rPr lang="en-US" dirty="0" smtClean="0"/>
+                        <a:t>QA automation</a:t>
+                      </a:r>
+                    </a:p>
+                    <a:p>
+                      <a:endParaRPr lang="en-US" dirty="0"/>
+                    </a:p>
+                  </a:txBody>
+                  <a:tcPr/>
+                </a:tc>
+                <a:tc>
+                  <a:txBody>
+                    <a:bodyPr/>
+                    <a:lstStyle/>
+                    <a:p>
+                      <a:pPr marL="0" marR="0" indent="0" algn="l" defTabSz="914400" rtl="0" eaLnBrk="1" fontAlgn="auto" latinLnBrk="0" hangingPunct="1">
+                        <a:lnSpc>
+                          <a:spcPct val="100000"/>
+                        </a:lnSpc>
+                        <a:spcBef>
+                          <a:spcPts val="0"/>
+                        </a:spcBef>
+                        <a:spcAft>
+                          <a:spcPts val="0"/>
+                        </a:spcAft>
+                        <a:buClrTx/>
+                        <a:buSzTx/>
+                        <a:buFontTx/>
+                        <a:buNone/>
+                        <a:tabLst/>
+                        <a:defRPr/>
+                      </a:pPr>
+                      <a:r>
+                        <a:rPr lang="en-US" dirty="0" smtClean="0"/>
+                        <a:t>Junit and WebDriver </a:t>
+                      </a:r>
+                      <a:r>
+                        <a:rPr lang="en-US" baseline="0" dirty="0" smtClean="0"/>
+                        <a:t>to Selenium Server</a:t>
+                      </a:r>
+                      <a:endParaRPr lang="en-US" dirty="0" smtClean="0"/>
+                    </a:p>
+                    <a:p>
+                      <a:endParaRPr lang="en-US" dirty="0"/>
+                    </a:p>
+                  </a:txBody>
+                  <a:tcPr/>
+                </a:tc>
+              </a:tr>
+              <a:tr h="788585">
                 <a:tc>
                   <a:txBody>
                     <a:bodyPr/>
@@ -8269,100 +8432,27 @@
                     <a:bodyPr/>
                     <a:lstStyle/>
                     <a:p>
-                      <a:pPr algn="ctr"/>
-                      <a:r>
-                        <a:rPr lang="en-US" sz="2800" dirty="0" smtClean="0"/>
-                        <a:t>UI</a:t>
-                      </a:r>
-                      <a:endParaRPr lang="en-US" sz="2800" dirty="0"/>
-                    </a:p>
-                  </a:txBody>
-                  <a:tcPr/>
-                </a:tc>
-              </a:tr>
-              <a:tr h="788585">
-                <a:tc>
-                  <a:txBody>
-                    <a:bodyPr/>
-                    <a:lstStyle/>
-                    <a:p>
-                      <a:r>
-                        <a:rPr lang="en-US" dirty="0" smtClean="0"/>
-                        <a:t>Purpose</a:t>
-                      </a:r>
-                      <a:endParaRPr lang="en-US" dirty="0"/>
-                    </a:p>
-                  </a:txBody>
-                  <a:tcPr/>
-                </a:tc>
-                <a:tc>
-                  <a:txBody>
-                    <a:bodyPr/>
-                    <a:lstStyle/>
-                    <a:p>
-                      <a:r>
-                        <a:rPr lang="en-US" dirty="0" smtClean="0"/>
-                        <a:t>Test Units of Code, Aid with Design and Code Quality</a:t>
-                      </a:r>
-                      <a:endParaRPr lang="en-US" dirty="0"/>
-                    </a:p>
-                  </a:txBody>
-                  <a:tcPr/>
-                </a:tc>
-                <a:tc>
-                  <a:txBody>
-                    <a:bodyPr/>
-                    <a:lstStyle/>
-                    <a:p>
+                      <a:pPr marL="0" marR="0" indent="0" algn="l" defTabSz="914400" rtl="0" eaLnBrk="1" fontAlgn="auto" latinLnBrk="0" hangingPunct="1">
+                        <a:lnSpc>
+                          <a:spcPct val="100000"/>
+                        </a:lnSpc>
+                        <a:spcBef>
+                          <a:spcPts val="0"/>
+                        </a:spcBef>
+                        <a:spcAft>
+                          <a:spcPts val="0"/>
+                        </a:spcAft>
+                        <a:buClrTx/>
+                        <a:buSzTx/>
+                        <a:buFontTx/>
+                        <a:buNone/>
+                        <a:tabLst/>
+                        <a:defRPr/>
+                      </a:pPr>
                       <a:r>
                         <a:rPr lang="en-US" dirty="0" smtClean="0"/>
                         <a:t>Test Business Logic / Outputs to Inputs</a:t>
                       </a:r>
-                      <a:endParaRPr lang="en-US" dirty="0"/>
-                    </a:p>
-                  </a:txBody>
-                  <a:tcPr/>
-                </a:tc>
-                <a:tc>
-                  <a:txBody>
-                    <a:bodyPr/>
-                    <a:lstStyle/>
-                    <a:p>
-                      <a:r>
-                        <a:rPr lang="en-US" dirty="0" smtClean="0"/>
-                        <a:t>Test the User Interface, Provides some End-End confirmation</a:t>
-                      </a:r>
-                      <a:endParaRPr lang="en-US" dirty="0"/>
-                    </a:p>
-                  </a:txBody>
-                  <a:tcPr/>
-                </a:tc>
-              </a:tr>
-              <a:tr h="788585">
-                <a:tc>
-                  <a:txBody>
-                    <a:bodyPr/>
-                    <a:lstStyle/>
-                    <a:p>
-                      <a:r>
-                        <a:rPr lang="en-US" dirty="0" smtClean="0"/>
-                        <a:t>Authors</a:t>
-                      </a:r>
-                      <a:endParaRPr lang="en-US" dirty="0"/>
-                    </a:p>
-                  </a:txBody>
-                  <a:tcPr/>
-                </a:tc>
-                <a:tc>
-                  <a:txBody>
-                    <a:bodyPr/>
-                    <a:lstStyle/>
-                    <a:p>
-                      <a:r>
-                        <a:rPr lang="en-US" dirty="0" smtClean="0"/>
-                        <a:t>Developers</a:t>
-                      </a:r>
-                      <a:endParaRPr lang="en-US" dirty="0"/>
                     </a:p>
                   </a:txBody>
                   <a:tcPr/>
@@ -8390,10 +8480,30 @@
                     <a:bodyPr/>
                     <a:lstStyle/>
                     <a:p>
+                      <a:pPr marL="0" marR="0" indent="0" algn="l" defTabSz="914400" rtl="0" eaLnBrk="1" fontAlgn="auto" latinLnBrk="0" hangingPunct="1">
+                        <a:lnSpc>
+                          <a:spcPct val="100000"/>
+                        </a:lnSpc>
+                        <a:spcBef>
+                          <a:spcPts val="0"/>
+                        </a:spcBef>
+                        <a:spcAft>
+                          <a:spcPts val="0"/>
+                        </a:spcAft>
+                        <a:buClrTx/>
+                        <a:buSzTx/>
+                        <a:buFontTx/>
+                        <a:buNone/>
+                        <a:tabLst/>
+                        <a:defRPr/>
+                      </a:pPr>
                       <a:r>
-                        <a:rPr lang="en-US" dirty="0" smtClean="0"/>
-                        <a:t>QA automation</a:t>
+                        <a:rPr lang="en-US" dirty="0" err="1" smtClean="0"/>
+                        <a:t>Fitnesse</a:t>
                       </a:r>
+                      <a:endParaRPr lang="en-US" dirty="0" smtClean="0"/>
+                    </a:p>
+                    <a:p>
                       <a:endParaRPr lang="en-US" dirty="0"/>
                     </a:p>
                   </a:txBody>
@@ -8406,9 +8516,54 @@
                     <a:bodyPr/>
                     <a:lstStyle/>
                     <a:p>
+                      <a:pPr algn="ctr"/>
+                      <a:r>
+                        <a:rPr lang="en-US" sz="2800" dirty="0" smtClean="0"/>
+                        <a:t>Unit</a:t>
+                      </a:r>
+                      <a:endParaRPr lang="en-US" sz="2800" dirty="0"/>
+                    </a:p>
+                  </a:txBody>
+                  <a:tcPr/>
+                </a:tc>
+                <a:tc>
+                  <a:txBody>
+                    <a:bodyPr/>
+                    <a:lstStyle/>
+                    <a:p>
+                      <a:pPr marL="0" marR="0" indent="0" algn="l" defTabSz="914400" rtl="0" eaLnBrk="1" fontAlgn="auto" latinLnBrk="0" hangingPunct="1">
+                        <a:lnSpc>
+                          <a:spcPct val="100000"/>
+                        </a:lnSpc>
+                        <a:spcBef>
+                          <a:spcPts val="0"/>
+                        </a:spcBef>
+                        <a:spcAft>
+                          <a:spcPts val="0"/>
+                        </a:spcAft>
+                        <a:buClrTx/>
+                        <a:buSzTx/>
+                        <a:buFontTx/>
+                        <a:buNone/>
+                        <a:tabLst/>
+                        <a:defRPr/>
+                      </a:pPr>
                       <a:r>
                         <a:rPr lang="en-US" dirty="0" smtClean="0"/>
-                        <a:t>Tool</a:t>
+                        <a:t>Test Units of Code, Aid with Design and Code Quality</a:t>
+                      </a:r>
+                    </a:p>
+                  </a:txBody>
+                  <a:tcPr/>
+                </a:tc>
+                <a:tc>
+                  <a:txBody>
+                    <a:bodyPr/>
+                    <a:lstStyle/>
+                    <a:p>
+                      <a:r>
+                        <a:rPr lang="en-US" dirty="0" smtClean="0"/>
+                        <a:t>Developers</a:t>
                       </a:r>
                       <a:endParaRPr lang="en-US" dirty="0"/>
                     </a:p>
@@ -8420,43 +8575,30 @@
                     <a:bodyPr/>
                     <a:lstStyle/>
                     <a:p>
+                      <a:pPr marL="0" marR="0" indent="0" algn="l" defTabSz="914400" rtl="0" eaLnBrk="1" fontAlgn="auto" latinLnBrk="0" hangingPunct="1">
+                        <a:lnSpc>
+                          <a:spcPct val="100000"/>
+                        </a:lnSpc>
+                        <a:spcBef>
+                          <a:spcPts val="0"/>
+                        </a:spcBef>
+                        <a:spcAft>
+                          <a:spcPts val="0"/>
+                        </a:spcAft>
+                        <a:buClrTx/>
+                        <a:buSzTx/>
+                        <a:buFontTx/>
+                        <a:buNone/>
+                        <a:tabLst/>
+                        <a:defRPr/>
+                      </a:pPr>
                       <a:r>
                         <a:rPr lang="en-US" dirty="0" smtClean="0"/>
                         <a:t>Junit, Jasmine</a:t>
                       </a:r>
-                      <a:endParaRPr lang="en-US" dirty="0"/>
                     </a:p>
-                  </a:txBody>
-                  <a:tcPr/>
-                </a:tc>
-                <a:tc>
-                  <a:txBody>
-                    <a:bodyPr/>
-                    <a:lstStyle/>
                     <a:p>
-                      <a:r>
-                        <a:rPr lang="en-US" dirty="0" err="1" smtClean="0"/>
-                        <a:t>Fitnesse</a:t>
-                      </a:r>
-                      <a:endParaRPr lang="en-US" dirty="0"/>
-                    </a:p>
-                  </a:txBody>
-                  <a:tcPr/>
-                </a:tc>
-                <a:tc>
-                  <a:txBody>
-                    <a:bodyPr/>
-                    <a:lstStyle/>
-                    <a:p>
-                      <a:r>
-                        <a:rPr lang="en-US" dirty="0" smtClean="0"/>
-                        <a:t>Selenium</a:t>
-                      </a:r>
-                      <a:r>
-                        <a:rPr lang="en-US" baseline="0" dirty="0" smtClean="0"/>
-                        <a:t> via Junit</a:t>
-                      </a:r>
-                      <a:endParaRPr lang="en-US" dirty="0"/>
+                      <a:endParaRPr lang="en-US" dirty="0" smtClean="0"/>
                     </a:p>
                   </a:txBody>
                   <a:tcPr/>
@@ -8466,6 +8608,36 @@
           </a:graphicData>
         </a:graphic>
       </p:graphicFrame>
+      <p:sp>
+        <p:nvSpPr>
+          <p:cNvPr id="6" name="TextBox 5"/>
+          <p:cNvSpPr txBox="1"/>
+          <p:nvPr/>
+        </p:nvSpPr>
+        <p:spPr>
+          <a:xfrm>
+            <a:off x="838200" y="5346718"/>
+            <a:ext cx="7421380" cy="369332"/>
+          </a:xfrm>
+          <a:prstGeom prst="rect">
+            <a:avLst/>
+          </a:prstGeom>
+          <a:noFill/>
+        </p:spPr>
+        <p:txBody>
+          <a:bodyPr wrap="square" rtlCol="0">
+            <a:spAutoFit/>
+          </a:bodyPr>
+          <a:lstStyle/>
+          <a:p>
+            <a:r>
+              <a:rPr lang="en-US" dirty="0" smtClean="0"/>
+              <a:t>Other types or dimensions of tests to consider: Performance, Integration, etc. </a:t>
+            </a:r>
+            <a:endParaRPr lang="en-US" dirty="0"/>
+          </a:p>
+        </p:txBody>
+      </p:sp>
     </p:spTree>
     <p:extLst>
       <p:ext uri="{BB962C8B-B14F-4D97-AF65-F5344CB8AC3E}">

</xml_diff>

<commit_message>
change image for presentation
</commit_message>
<xml_diff>
--- a/Test Pyramid Presentation.pptx
+++ b/Test Pyramid Presentation.pptx
@@ -211,7 +211,7 @@
           <a:p>
             <a:fld id="{51E71193-F4DE-7347-96CF-6A9725F5B501}" type="datetimeFigureOut">
               <a:rPr lang="en-US" smtClean="0"/>
-              <a:t>8/7/17</a:t>
+              <a:t>9/22/17</a:t>
             </a:fld>
             <a:endParaRPr lang="en-US"/>
           </a:p>
@@ -529,15 +529,7 @@
             </a:pPr>
             <a:r>
               <a:rPr lang="en-US" sz="1200" baseline="0" dirty="0" smtClean="0"/>
-              <a:t>Develop software at hospital </a:t>
-            </a:r>
-            <a:r>
-              <a:rPr lang="en-US" sz="1200" baseline="0" dirty="0" smtClean="0"/>
-              <a:t>- testing is </a:t>
-            </a:r>
-            <a:r>
-              <a:rPr lang="en-US" sz="1200" baseline="0" dirty="0" smtClean="0"/>
-              <a:t>important </a:t>
+              <a:t>Develop software at hospital - testing is important </a:t>
             </a:r>
             <a:r>
               <a:rPr lang="mr-IN" sz="1200" baseline="0" dirty="0" smtClean="0"/>
@@ -547,7 +539,6 @@
               <a:rPr lang="en-US" sz="1200" baseline="0" dirty="0" smtClean="0"/>
               <a:t> critical systems.</a:t>
             </a:r>
-            <a:endParaRPr lang="en-US" sz="1200" baseline="0" dirty="0" smtClean="0"/>
           </a:p>
           <a:p>
             <a:pPr marL="171450" indent="-171450">
@@ -578,11 +569,7 @@
             </a:pPr>
             <a:r>
               <a:rPr lang="en-US" sz="1200" baseline="0" dirty="0" smtClean="0"/>
-              <a:t>2009 Succeeding </a:t>
-            </a:r>
-            <a:r>
-              <a:rPr lang="en-US" sz="1200" baseline="0" dirty="0" smtClean="0"/>
-              <a:t>with Agile, Mike Cohn’s Test Pyramid </a:t>
+              <a:t>2009 Succeeding with Agile, Mike Cohn’s Test Pyramid </a:t>
             </a:r>
             <a:r>
               <a:rPr lang="mr-IN" sz="1200" baseline="0" dirty="0" smtClean="0"/>
@@ -590,13 +577,8 @@
             </a:r>
             <a:r>
               <a:rPr lang="en-US" sz="1200" baseline="0" dirty="0" smtClean="0"/>
-              <a:t> </a:t>
-            </a:r>
-            <a:r>
-              <a:rPr lang="en-US" sz="1200" baseline="0" dirty="0" smtClean="0"/>
-              <a:t>helpful concept for us.  </a:t>
-            </a:r>
-            <a:endParaRPr lang="en-US" sz="1200" baseline="0" dirty="0" smtClean="0"/>
+              <a:t> helpful concept for us.  </a:t>
+            </a:r>
           </a:p>
           <a:p>
             <a:pPr marL="171450" indent="-171450">
@@ -605,15 +587,7 @@
             </a:pPr>
             <a:r>
               <a:rPr lang="en-US" sz="1200" baseline="0" dirty="0" smtClean="0"/>
-              <a:t>We’ll look </a:t>
-            </a:r>
-            <a:r>
-              <a:rPr lang="en-US" sz="1200" baseline="0" dirty="0" smtClean="0"/>
-              <a:t>at implementation for an application</a:t>
-            </a:r>
-            <a:r>
-              <a:rPr lang="en-US" sz="1200" baseline="0" dirty="0" smtClean="0"/>
-              <a:t>, discuss how achieved.</a:t>
+              <a:t>We’ll look at implementation for an application, discuss how achieved.</a:t>
             </a:r>
           </a:p>
           <a:p>
@@ -1571,11 +1545,7 @@
             </a:pPr>
             <a:r>
               <a:rPr lang="en-US" baseline="0" dirty="0" smtClean="0"/>
-              <a:t>Follow </a:t>
-            </a:r>
-            <a:r>
-              <a:rPr lang="en-US" baseline="0" dirty="0" smtClean="0"/>
-              <a:t>up article by Cohn </a:t>
+              <a:t>Follow up article by Cohn </a:t>
             </a:r>
             <a:r>
               <a:rPr lang="mr-IN" baseline="0" dirty="0" smtClean="0"/>
@@ -1583,11 +1553,7 @@
             </a:r>
             <a:r>
               <a:rPr lang="en-US" baseline="0" dirty="0" smtClean="0"/>
-              <a:t> Forgotten Layer of the Test Automation Pyramid regarding service </a:t>
-            </a:r>
-            <a:r>
-              <a:rPr lang="en-US" baseline="0" dirty="0" smtClean="0"/>
-              <a:t>layer </a:t>
+              <a:t> Forgotten Layer of the Test Automation Pyramid regarding service layer </a:t>
             </a:r>
             <a:r>
               <a:rPr lang="mr-IN" baseline="0" dirty="0" smtClean="0"/>
@@ -1597,7 +1563,6 @@
               <a:rPr lang="en-US" baseline="0" dirty="0" smtClean="0"/>
               <a:t> not really referring to SOA.</a:t>
             </a:r>
-            <a:endParaRPr lang="en-US" baseline="0" dirty="0" smtClean="0"/>
           </a:p>
           <a:p>
             <a:pPr marL="171450" indent="-171450">
@@ -1636,11 +1601,7 @@
             </a:r>
             <a:r>
               <a:rPr lang="en-US" baseline="0" dirty="0" smtClean="0"/>
-              <a:t> there are others (Crispin, Business Facing, Technology </a:t>
-            </a:r>
-            <a:r>
-              <a:rPr lang="en-US" baseline="0" dirty="0" smtClean="0"/>
-              <a:t>Facing, Performance testing, usability testing, </a:t>
+              <a:t> there are others (Crispin, Business Facing, Technology Facing, Performance testing, usability testing, </a:t>
             </a:r>
             <a:r>
               <a:rPr lang="en-US" baseline="0" dirty="0" err="1" smtClean="0"/>
@@ -1847,19 +1808,7 @@
             </a:r>
             <a:r>
               <a:rPr lang="en-US" baseline="0" dirty="0" smtClean="0"/>
-              <a:t>layers of tests, </a:t>
-            </a:r>
-            <a:r>
-              <a:rPr lang="en-US" baseline="0" dirty="0" smtClean="0"/>
-              <a:t>what </a:t>
-            </a:r>
-            <a:r>
-              <a:rPr lang="en-US" baseline="0" dirty="0" smtClean="0"/>
-              <a:t>purpose for those layers, </a:t>
-            </a:r>
-            <a:r>
-              <a:rPr lang="en-US" baseline="0" dirty="0" smtClean="0"/>
-              <a:t>what tools, who authors, at what point in the iteration </a:t>
+              <a:t>layers of tests, what purpose for those layers, what tools, who authors, at what point in the iteration </a:t>
             </a:r>
             <a:r>
               <a:rPr lang="mr-IN" baseline="0" dirty="0" smtClean="0"/>
@@ -1867,13 +1816,8 @@
             </a:r>
             <a:r>
               <a:rPr lang="en-US" baseline="0" dirty="0" smtClean="0"/>
-              <a:t> all </a:t>
-            </a:r>
-            <a:r>
-              <a:rPr lang="en-US" baseline="0" dirty="0" smtClean="0"/>
-              <a:t>requires planning.</a:t>
-            </a:r>
-            <a:endParaRPr lang="en-US" baseline="0" dirty="0" smtClean="0"/>
+              <a:t> all requires planning.</a:t>
+            </a:r>
           </a:p>
           <a:p>
             <a:pPr marL="171450" indent="-171450">
@@ -1882,13 +1826,8 @@
             </a:pPr>
             <a:r>
               <a:rPr lang="en-US" baseline="0" dirty="0" smtClean="0"/>
-              <a:t>Everyone on team needs to have a common </a:t>
-            </a:r>
-            <a:r>
-              <a:rPr lang="en-US" baseline="0" dirty="0" smtClean="0"/>
-              <a:t>understanding.</a:t>
-            </a:r>
-            <a:endParaRPr lang="en-US" baseline="0" dirty="0" smtClean="0"/>
+              <a:t>Everyone on team needs to have a common understanding.</a:t>
+            </a:r>
           </a:p>
           <a:p>
             <a:pPr marL="171450" indent="-171450">
@@ -1905,13 +1844,8 @@
             </a:r>
             <a:r>
               <a:rPr lang="en-US" baseline="0" dirty="0" smtClean="0"/>
-              <a:t> avoid gaps and </a:t>
-            </a:r>
-            <a:r>
-              <a:rPr lang="en-US" baseline="0" dirty="0" smtClean="0"/>
-              <a:t>excessive duplication.</a:t>
-            </a:r>
-            <a:endParaRPr lang="en-US" baseline="0" dirty="0" smtClean="0"/>
+              <a:t> avoid gaps and excessive duplication.</a:t>
+            </a:r>
           </a:p>
         </p:txBody>
       </p:sp>
@@ -2005,11 +1939,7 @@
             </a:r>
             <a:r>
               <a:rPr lang="en-US" baseline="0" dirty="0" smtClean="0"/>
-              <a:t> at code and test for sample application, how they fit into our intentional testing layers</a:t>
-            </a:r>
-            <a:r>
-              <a:rPr lang="en-US" baseline="0" dirty="0" smtClean="0"/>
-              <a:t>.  Based on real prescribing application.</a:t>
+              <a:t> at code and test for sample application, how they fit into our intentional testing layers.  Based on real prescribing application.</a:t>
             </a:r>
             <a:endParaRPr lang="en-US" dirty="0" smtClean="0"/>
           </a:p>
@@ -2034,19 +1964,7 @@
             </a:r>
             <a:r>
               <a:rPr lang="en-US" baseline="0" dirty="0" smtClean="0"/>
-              <a:t> / static web </a:t>
-            </a:r>
-            <a:r>
-              <a:rPr lang="en-US" baseline="0" dirty="0" smtClean="0"/>
-              <a:t>app with a </a:t>
-            </a:r>
-            <a:r>
-              <a:rPr lang="en-US" baseline="0" dirty="0" smtClean="0"/>
-              <a:t>java back-end </a:t>
-            </a:r>
-            <a:r>
-              <a:rPr lang="en-US" baseline="0" dirty="0" smtClean="0"/>
-              <a:t>service layer</a:t>
+              <a:t> / static web app with a java back-end service layer</a:t>
             </a:r>
           </a:p>
         </p:txBody>
@@ -2133,11 +2051,7 @@
           <a:p>
             <a:r>
               <a:rPr lang="en-US" dirty="0" smtClean="0"/>
-              <a:t>- Roughly how </a:t>
-            </a:r>
-            <a:r>
-              <a:rPr lang="en-US" dirty="0" smtClean="0"/>
-              <a:t>functionality</a:t>
+              <a:t>- Roughly how functionality</a:t>
             </a:r>
             <a:r>
               <a:rPr lang="en-US" baseline="0" dirty="0" smtClean="0"/>
@@ -2145,27 +2059,11 @@
             </a:r>
             <a:r>
               <a:rPr lang="en-US" dirty="0" smtClean="0"/>
-              <a:t>tests </a:t>
-            </a:r>
-            <a:r>
-              <a:rPr lang="en-US" dirty="0" smtClean="0"/>
-              <a:t>were </a:t>
-            </a:r>
-            <a:r>
-              <a:rPr lang="en-US" dirty="0" smtClean="0"/>
-              <a:t>implemented</a:t>
+              <a:t>tests were implemented</a:t>
             </a:r>
             <a:r>
               <a:rPr lang="en-US" baseline="0" dirty="0" smtClean="0"/>
-              <a:t> in </a:t>
-            </a:r>
-            <a:r>
-              <a:rPr lang="en-US" baseline="0" dirty="0" smtClean="0"/>
-              <a:t>the real </a:t>
-            </a:r>
-            <a:r>
-              <a:rPr lang="en-US" baseline="0" dirty="0" smtClean="0"/>
-              <a:t>application.</a:t>
+              <a:t> in the real application.</a:t>
             </a:r>
           </a:p>
           <a:p>
@@ -2179,15 +2077,7 @@
             </a:r>
             <a:r>
               <a:rPr lang="en-US" baseline="0" dirty="0" smtClean="0"/>
-              <a:t> </a:t>
-            </a:r>
-            <a:r>
-              <a:rPr lang="en-US" baseline="0" dirty="0" smtClean="0"/>
-              <a:t>chosen to provide high </a:t>
-            </a:r>
-            <a:r>
-              <a:rPr lang="en-US" baseline="0" dirty="0" smtClean="0"/>
-              <a:t>visibility (more critical </a:t>
+              <a:t> chosen to provide high visibility (more critical </a:t>
             </a:r>
             <a:r>
               <a:rPr lang="mr-IN" baseline="0" dirty="0" smtClean="0"/>
@@ -2203,11 +2093,7 @@
             </a:r>
             <a:r>
               <a:rPr lang="en-US" baseline="0" dirty="0" smtClean="0"/>
-              <a:t>) </a:t>
-            </a:r>
-            <a:r>
-              <a:rPr lang="en-US" baseline="0" dirty="0" smtClean="0"/>
-              <a:t>of business logic tests to customers, and to drive feature development </a:t>
+              <a:t>) of business logic tests to customers, and to drive feature development </a:t>
             </a:r>
             <a:r>
               <a:rPr lang="mr-IN" baseline="0" dirty="0" smtClean="0"/>
@@ -2215,11 +2101,7 @@
             </a:r>
             <a:r>
               <a:rPr lang="en-US" baseline="0" dirty="0" smtClean="0"/>
-              <a:t> tended to be written ahead of assigning feature to developers</a:t>
-            </a:r>
-            <a:r>
-              <a:rPr lang="en-US" baseline="0" dirty="0" smtClean="0"/>
-              <a:t>.</a:t>
+              <a:t> tended to be written ahead of assigning feature to developers.</a:t>
             </a:r>
           </a:p>
           <a:p>
@@ -2231,7 +2113,6 @@
               <a:rPr lang="en-US" baseline="0" dirty="0" smtClean="0"/>
               <a:t>Would discuss with each feature how tests for that feature would fall into these groupings.</a:t>
             </a:r>
-            <a:endParaRPr lang="en-US" baseline="0" dirty="0" smtClean="0"/>
           </a:p>
         </p:txBody>
       </p:sp>
@@ -2339,11 +2220,7 @@
           <a:p>
             <a:r>
               <a:rPr lang="en-US" baseline="0" dirty="0" smtClean="0"/>
-              <a:t>- </a:t>
-            </a:r>
-            <a:r>
-              <a:rPr lang="en-US" baseline="0" dirty="0" smtClean="0"/>
-              <a:t>What are parts we need to implement?</a:t>
+              <a:t>- What are parts we need to implement?</a:t>
             </a:r>
           </a:p>
           <a:p>
@@ -2506,16 +2383,11 @@
               <a:rPr lang="en-US" baseline="0" dirty="0" smtClean="0"/>
               <a:t>.</a:t>
             </a:r>
-            <a:endParaRPr lang="en-US" baseline="0" dirty="0" smtClean="0"/>
           </a:p>
           <a:p>
             <a:r>
               <a:rPr lang="en-US" baseline="0" dirty="0" smtClean="0"/>
-              <a:t>Intentional, pre-planned distribution </a:t>
-            </a:r>
-            <a:r>
-              <a:rPr lang="en-US" baseline="0" dirty="0" smtClean="0"/>
-              <a:t>of tests for the feature.</a:t>
+              <a:t>Intentional, pre-planned distribution of tests for the feature.</a:t>
             </a:r>
           </a:p>
           <a:p>
@@ -6676,23 +6548,7 @@
           <a:p>
             <a:r>
               <a:rPr lang="en-US" dirty="0" smtClean="0"/>
-              <a:t>When a bug hits production, don’t just fix it - find the test </a:t>
-            </a:r>
-            <a:r>
-              <a:rPr lang="en-US" dirty="0" smtClean="0"/>
-              <a:t>gaps </a:t>
-            </a:r>
-            <a:r>
-              <a:rPr lang="en-US" dirty="0" smtClean="0"/>
-              <a:t>and close </a:t>
-            </a:r>
-            <a:r>
-              <a:rPr lang="en-US" dirty="0" smtClean="0"/>
-              <a:t>them</a:t>
-            </a:r>
-            <a:r>
-              <a:rPr lang="en-US" dirty="0" smtClean="0"/>
-              <a:t>.</a:t>
+              <a:t>When a bug hits production, don’t just fix it - find the test gaps and close them.</a:t>
             </a:r>
             <a:endParaRPr lang="en-US" dirty="0"/>
           </a:p>
@@ -7223,9 +7079,93 @@
           </a:p>
         </p:txBody>
       </p:sp>
+      <p:sp>
+        <p:nvSpPr>
+          <p:cNvPr id="6" name="Rectangle 5"/>
+          <p:cNvSpPr/>
+          <p:nvPr/>
+        </p:nvSpPr>
+        <p:spPr>
+          <a:xfrm>
+            <a:off x="6096000" y="1690686"/>
+            <a:ext cx="4496972" cy="4001095"/>
+          </a:xfrm>
+          <a:prstGeom prst="rect">
+            <a:avLst/>
+          </a:prstGeom>
+        </p:spPr>
+        <p:txBody>
+          <a:bodyPr wrap="square">
+            <a:spAutoFit/>
+          </a:bodyPr>
+          <a:lstStyle/>
+          <a:p>
+            <a:pPr marL="285750" indent="-285750">
+              <a:spcAft>
+                <a:spcPts val="1200"/>
+              </a:spcAft>
+              <a:buFont typeface="Arial" charset="0"/>
+              <a:buChar char="•"/>
+            </a:pPr>
+            <a:r>
+              <a:rPr lang="en-US" sz="2800" dirty="0" smtClean="0"/>
+              <a:t>Foundational base of unit tests</a:t>
+            </a:r>
+          </a:p>
+          <a:p>
+            <a:pPr marL="285750" indent="-285750">
+              <a:spcAft>
+                <a:spcPts val="1200"/>
+              </a:spcAft>
+              <a:buFont typeface="Arial" charset="0"/>
+              <a:buChar char="•"/>
+            </a:pPr>
+            <a:r>
+              <a:rPr lang="en-US" sz="2800" dirty="0" smtClean="0"/>
+              <a:t>Minimum necessary tests through user interface</a:t>
+            </a:r>
+          </a:p>
+          <a:p>
+            <a:pPr marL="285750" indent="-285750">
+              <a:spcAft>
+                <a:spcPts val="1200"/>
+              </a:spcAft>
+              <a:buFont typeface="Arial" charset="0"/>
+              <a:buChar char="•"/>
+            </a:pPr>
+            <a:r>
+              <a:rPr lang="en-US" sz="2800" dirty="0" smtClean="0"/>
+              <a:t>Service tests in the middle </a:t>
+            </a:r>
+            <a:endParaRPr lang="en-US" sz="2800" dirty="0"/>
+          </a:p>
+          <a:p>
+            <a:pPr marL="285750" indent="-285750">
+              <a:spcAft>
+                <a:spcPts val="1200"/>
+              </a:spcAft>
+              <a:buFont typeface="Arial" charset="0"/>
+              <a:buChar char="•"/>
+            </a:pPr>
+            <a:r>
+              <a:rPr lang="en-US" sz="2800" dirty="0" smtClean="0"/>
+              <a:t>Service refers to logical services </a:t>
+            </a:r>
+            <a:r>
+              <a:rPr lang="mr-IN" sz="2800" dirty="0" smtClean="0"/>
+              <a:t>–</a:t>
+            </a:r>
+            <a:r>
+              <a:rPr lang="en-US" sz="2800" dirty="0" smtClean="0"/>
+              <a:t> business logic, required outputs to inputs.</a:t>
+            </a:r>
+            <a:endParaRPr lang="en-US" sz="2800" dirty="0"/>
+          </a:p>
+        </p:txBody>
+      </p:sp>
       <p:pic>
         <p:nvPicPr>
-          <p:cNvPr id="4" name="Content Placeholder 3"/>
+          <p:cNvPr id="5" name="Content Placeholder 4"/>
           <p:cNvPicPr>
             <a:picLocks noGrp="1" noChangeAspect="1"/>
           </p:cNvPicPr>
@@ -7247,103 +7187,11 @@
         </p:blipFill>
         <p:spPr>
           <a:xfrm>
-            <a:off x="311321" y="1690688"/>
-            <a:ext cx="5669933" cy="3964524"/>
+            <a:off x="321044" y="1771422"/>
+            <a:ext cx="5675586" cy="3920359"/>
           </a:xfrm>
         </p:spPr>
       </p:pic>
-      <p:sp>
-        <p:nvSpPr>
-          <p:cNvPr id="6" name="Rectangle 5"/>
-          <p:cNvSpPr/>
-          <p:nvPr/>
-        </p:nvSpPr>
-        <p:spPr>
-          <a:xfrm>
-            <a:off x="6096000" y="1690686"/>
-            <a:ext cx="4496972" cy="4001095"/>
-          </a:xfrm>
-          <a:prstGeom prst="rect">
-            <a:avLst/>
-          </a:prstGeom>
-        </p:spPr>
-        <p:txBody>
-          <a:bodyPr wrap="square">
-            <a:spAutoFit/>
-          </a:bodyPr>
-          <a:lstStyle/>
-          <a:p>
-            <a:pPr marL="285750" indent="-285750">
-              <a:spcAft>
-                <a:spcPts val="1200"/>
-              </a:spcAft>
-              <a:buFont typeface="Arial" charset="0"/>
-              <a:buChar char="•"/>
-            </a:pPr>
-            <a:r>
-              <a:rPr lang="en-US" sz="2800" dirty="0" smtClean="0"/>
-              <a:t>Foundational base of unit tests</a:t>
-            </a:r>
-          </a:p>
-          <a:p>
-            <a:pPr marL="285750" indent="-285750">
-              <a:spcAft>
-                <a:spcPts val="1200"/>
-              </a:spcAft>
-              <a:buFont typeface="Arial" charset="0"/>
-              <a:buChar char="•"/>
-            </a:pPr>
-            <a:r>
-              <a:rPr lang="en-US" sz="2800" dirty="0" smtClean="0"/>
-              <a:t>Minimum necessary tests through user interface</a:t>
-            </a:r>
-          </a:p>
-          <a:p>
-            <a:pPr marL="285750" indent="-285750">
-              <a:spcAft>
-                <a:spcPts val="1200"/>
-              </a:spcAft>
-              <a:buFont typeface="Arial" charset="0"/>
-              <a:buChar char="•"/>
-            </a:pPr>
-            <a:r>
-              <a:rPr lang="en-US" sz="2800" dirty="0" smtClean="0"/>
-              <a:t>Service </a:t>
-            </a:r>
-            <a:r>
-              <a:rPr lang="en-US" sz="2800" dirty="0" smtClean="0"/>
-              <a:t>tests in </a:t>
-            </a:r>
-            <a:r>
-              <a:rPr lang="en-US" sz="2800" dirty="0" smtClean="0"/>
-              <a:t>the middle </a:t>
-            </a:r>
-            <a:endParaRPr lang="en-US" sz="2800" dirty="0"/>
-          </a:p>
-          <a:p>
-            <a:pPr marL="285750" indent="-285750">
-              <a:spcAft>
-                <a:spcPts val="1200"/>
-              </a:spcAft>
-              <a:buFont typeface="Arial" charset="0"/>
-              <a:buChar char="•"/>
-            </a:pPr>
-            <a:r>
-              <a:rPr lang="en-US" sz="2800" dirty="0" smtClean="0"/>
-              <a:t>Service refers to logical services </a:t>
-            </a:r>
-            <a:r>
-              <a:rPr lang="mr-IN" sz="2800" dirty="0" smtClean="0"/>
-              <a:t>–</a:t>
-            </a:r>
-            <a:r>
-              <a:rPr lang="en-US" sz="2800" dirty="0" smtClean="0"/>
-              <a:t> business logic, required outputs to inputs.</a:t>
-            </a:r>
-            <a:endParaRPr lang="en-US" sz="2800" dirty="0"/>
-          </a:p>
-        </p:txBody>
-      </p:sp>
     </p:spTree>
     <p:extLst>
       <p:ext uri="{BB962C8B-B14F-4D97-AF65-F5344CB8AC3E}">
@@ -8406,23 +8254,7 @@
                       </a:pPr>
                       <a:r>
                         <a:rPr lang="en-US" sz="2000" dirty="0" smtClean="0"/>
-                        <a:t>Test UI functionality, </a:t>
-                      </a:r>
-                      <a:r>
-                        <a:rPr lang="en-US" sz="2000" dirty="0" smtClean="0"/>
-                        <a:t>provide </a:t>
-                      </a:r>
-                      <a:r>
-                        <a:rPr lang="en-US" sz="2000" dirty="0" smtClean="0"/>
-                        <a:t>some </a:t>
-                      </a:r>
-                      <a:r>
-                        <a:rPr lang="en-US" sz="2000" dirty="0" smtClean="0"/>
-                        <a:t>end-end </a:t>
-                      </a:r>
-                      <a:r>
-                        <a:rPr lang="en-US" sz="2000" dirty="0" smtClean="0"/>
-                        <a:t>confirmation</a:t>
+                        <a:t>Test UI functionality, provide some end-end confirmation</a:t>
                       </a:r>
                     </a:p>
                   </a:txBody>
@@ -8540,11 +8372,7 @@
                       </a:pPr>
                       <a:r>
                         <a:rPr lang="en-US" sz="2000" dirty="0" smtClean="0"/>
-                        <a:t>Test </a:t>
-                      </a:r>
-                      <a:r>
-                        <a:rPr lang="en-US" sz="2000" dirty="0" smtClean="0"/>
-                        <a:t>business logic,</a:t>
+                        <a:t>Test business logic,</a:t>
                       </a:r>
                       <a:r>
                         <a:rPr lang="en-US" sz="2000" baseline="0" dirty="0" smtClean="0"/>
@@ -8648,27 +8476,7 @@
                       </a:pPr>
                       <a:r>
                         <a:rPr lang="en-US" sz="2000" dirty="0" smtClean="0"/>
-                        <a:t>Test </a:t>
-                      </a:r>
-                      <a:r>
-                        <a:rPr lang="en-US" sz="2000" dirty="0" smtClean="0"/>
-                        <a:t>implementation, aid </a:t>
-                      </a:r>
-                      <a:r>
-                        <a:rPr lang="en-US" sz="2000" dirty="0" smtClean="0"/>
-                        <a:t>with </a:t>
-                      </a:r>
-                      <a:r>
-                        <a:rPr lang="en-US" sz="2000" dirty="0" smtClean="0"/>
-                        <a:t>design </a:t>
-                      </a:r>
-                      <a:r>
-                        <a:rPr lang="en-US" sz="2000" dirty="0" smtClean="0"/>
-                        <a:t>and </a:t>
-                      </a:r>
-                      <a:r>
-                        <a:rPr lang="en-US" sz="2000" dirty="0" smtClean="0"/>
-                        <a:t>internal</a:t>
+                        <a:t>Test implementation, aid with design and internal</a:t>
                       </a:r>
                       <a:r>
                         <a:rPr lang="en-US" sz="2000" baseline="0" dirty="0" smtClean="0"/>
@@ -8678,7 +8486,6 @@
                         <a:rPr lang="en-US" sz="2000" dirty="0" smtClean="0"/>
                         <a:t>ode quality</a:t>
                       </a:r>
-                      <a:endParaRPr lang="en-US" sz="2000" dirty="0" smtClean="0"/>
                     </a:p>
                   </a:txBody>
                   <a:tcPr/>
@@ -9029,11 +8836,7 @@
                     <a:p>
                       <a:r>
                         <a:rPr lang="en-US" sz="2400" dirty="0" smtClean="0"/>
-                        <a:t>Identify if drug being prescribed is </a:t>
-                      </a:r>
-                      <a:r>
-                        <a:rPr lang="en-US" sz="2400" dirty="0" smtClean="0"/>
-                        <a:t>Opiate</a:t>
+                        <a:t>Identify if drug being prescribed is Opiate</a:t>
                       </a:r>
                       <a:endParaRPr lang="en-US" sz="2400" dirty="0"/>
                     </a:p>
@@ -9083,11 +8886,7 @@
                       </a:r>
                       <a:r>
                         <a:rPr lang="en-US" sz="2400" baseline="0" dirty="0" smtClean="0"/>
-                        <a:t> </a:t>
-                      </a:r>
-                      <a:r>
-                        <a:rPr lang="en-US" sz="2400" baseline="0" dirty="0" smtClean="0"/>
-                        <a:t>duration</a:t>
+                        <a:t> duration</a:t>
                       </a:r>
                       <a:endParaRPr lang="en-US" sz="2400" dirty="0"/>
                     </a:p>

</xml_diff>